<commit_message>
updated course presentation with new material
</commit_message>
<xml_diff>
--- a/University of Washington Class/Module 9 - Automated switching and reconfiguration.pptx
+++ b/University of Washington Class/Module 9 - Automated switching and reconfiguration.pptx
@@ -497,7 +497,7 @@
               <a:pPr>
                 <a:defRPr/>
               </a:pPr>
-              <a:t>12/15/2011</a:t>
+              <a:t>12/22/2011</a:t>
             </a:fld>
             <a:endParaRPr lang="en-US" dirty="0"/>
           </a:p>
@@ -718,7 +718,7 @@
               <a:pPr>
                 <a:defRPr/>
               </a:pPr>
-              <a:t>12/15/2011</a:t>
+              <a:t>12/22/2011</a:t>
             </a:fld>
             <a:endParaRPr lang="en-US" dirty="0"/>
           </a:p>
@@ -1043,7 +1043,7 @@
               <a:pPr>
                 <a:defRPr/>
               </a:pPr>
-              <a:t>12/15/2011</a:t>
+              <a:t>12/22/2011</a:t>
             </a:fld>
             <a:endParaRPr lang="en-US" dirty="0"/>
           </a:p>
@@ -1494,7 +1494,7 @@
               <a:pPr>
                 <a:defRPr/>
               </a:pPr>
-              <a:t>12/15/2011</a:t>
+              <a:t>12/22/2011</a:t>
             </a:fld>
             <a:endParaRPr lang="en-US" dirty="0"/>
           </a:p>
@@ -1639,7 +1639,7 @@
               <a:pPr>
                 <a:defRPr/>
               </a:pPr>
-              <a:t>12/15/2011</a:t>
+              <a:t>12/22/2011</a:t>
             </a:fld>
             <a:endParaRPr lang="en-US" dirty="0"/>
           </a:p>
@@ -1761,7 +1761,7 @@
               <a:pPr>
                 <a:defRPr/>
               </a:pPr>
-              <a:t>12/15/2011</a:t>
+              <a:t>12/22/2011</a:t>
             </a:fld>
             <a:endParaRPr lang="en-US" dirty="0"/>
           </a:p>
@@ -2054,7 +2054,7 @@
               <a:pPr>
                 <a:defRPr/>
               </a:pPr>
-              <a:t>12/15/2011</a:t>
+              <a:t>12/22/2011</a:t>
             </a:fld>
             <a:endParaRPr lang="en-US" dirty="0"/>
           </a:p>
@@ -6473,7 +6473,6 @@
               <a:rPr lang="en-US" dirty="0" smtClean="0"/>
               <a:t>Most commonly applied for 10MVA transformer and higher</a:t>
             </a:r>
-            <a:endParaRPr lang="en-US" dirty="0" smtClean="0"/>
           </a:p>
           <a:p>
             <a:endParaRPr lang="en-US" dirty="0"/>
@@ -11206,7 +11205,19 @@
             </a:r>
             <a:r>
               <a:rPr lang="en-US" dirty="0"/>
-              <a:t>arc column and allow the fuse to interrupt current at current </a:t>
+              <a:t>arc column and allow the </a:t>
+            </a:r>
+            <a:r>
+              <a:rPr lang="en-US"/>
+              <a:t>fuse </a:t>
+            </a:r>
+            <a:r>
+              <a:rPr lang="en-US" smtClean="0"/>
+              <a:t>to interrupt </a:t>
+            </a:r>
+            <a:r>
+              <a:rPr lang="en-US" dirty="0"/>
+              <a:t>current at current </a:t>
             </a:r>
             <a:r>
               <a:rPr lang="en-US" dirty="0" smtClean="0"/>
@@ -11859,7 +11870,7 @@
           <a:graphicData uri="http://schemas.openxmlformats.org/presentationml/2006/ole">
             <mc:AlternateContent xmlns:mc="http://schemas.openxmlformats.org/markup-compatibility/2006">
               <mc:Choice xmlns:v="urn:schemas-microsoft-com:vml" Requires="v">
-                <p:oleObj spid="_x0000_s9234" name="Equation" r:id="rId4" imgW="1511300" imgH="431800" progId="Equation.DSMT4">
+                <p:oleObj spid="_x0000_s9236" name="Equation" r:id="rId4" imgW="1511300" imgH="431800" progId="Equation.DSMT4">
                   <p:embed/>
                 </p:oleObj>
               </mc:Choice>

</xml_diff>

<commit_message>
Changes to module 9 for wording and clarity
</commit_message>
<xml_diff>
--- a/University of Washington Class/Module 9 - Automated switching and reconfiguration.pptx
+++ b/University of Washington Class/Module 9 - Automated switching and reconfiguration.pptx
@@ -9,13 +9,13 @@
     <p:sldId id="280" r:id="rId3"/>
     <p:sldId id="281" r:id="rId4"/>
     <p:sldId id="262" r:id="rId5"/>
-    <p:sldId id="265" r:id="rId6"/>
-    <p:sldId id="295" r:id="rId7"/>
-    <p:sldId id="297" r:id="rId8"/>
-    <p:sldId id="263" r:id="rId9"/>
-    <p:sldId id="264" r:id="rId10"/>
-    <p:sldId id="266" r:id="rId11"/>
-    <p:sldId id="267" r:id="rId12"/>
+    <p:sldId id="263" r:id="rId6"/>
+    <p:sldId id="264" r:id="rId7"/>
+    <p:sldId id="266" r:id="rId8"/>
+    <p:sldId id="267" r:id="rId9"/>
+    <p:sldId id="265" r:id="rId10"/>
+    <p:sldId id="295" r:id="rId11"/>
+    <p:sldId id="297" r:id="rId12"/>
     <p:sldId id="268" r:id="rId13"/>
     <p:sldId id="269" r:id="rId14"/>
     <p:sldId id="296" r:id="rId15"/>
@@ -2680,7 +2680,7 @@
           <a:p>
             <a:r>
               <a:rPr lang="en-US" dirty="0" smtClean="0"/>
-              <a:t>Circuit Breakers</a:t>
+              <a:t>Fuses</a:t>
             </a:r>
             <a:endParaRPr lang="en-US" dirty="0"/>
           </a:p>
@@ -2693,173 +2693,229 @@
             <a:spLocks noGrp="1"/>
           </p:cNvSpPr>
           <p:nvPr>
-            <p:ph idx="1"/>
-          </p:nvPr>
+            <p:ph sz="half" idx="1"/>
+          </p:nvPr>
+        </p:nvSpPr>
+        <p:spPr/>
+        <p:txBody>
+          <a:bodyPr>
+            <a:normAutofit lnSpcReduction="10000"/>
+          </a:bodyPr>
+          <a:lstStyle/>
+          <a:p>
+            <a:r>
+              <a:rPr lang="en-US" dirty="0" smtClean="0"/>
+              <a:t>Two types: expulsion </a:t>
+            </a:r>
+            <a:r>
+              <a:rPr lang="en-US" dirty="0"/>
+              <a:t>and current limiting </a:t>
+            </a:r>
+            <a:r>
+              <a:rPr lang="en-US" dirty="0" smtClean="0"/>
+              <a:t>fuses</a:t>
+            </a:r>
+          </a:p>
+          <a:p>
+            <a:r>
+              <a:rPr lang="en-US" dirty="0" smtClean="0"/>
+              <a:t>“Expulsion </a:t>
+            </a:r>
+            <a:r>
+              <a:rPr lang="en-US" dirty="0"/>
+              <a:t>fuses use gas generation and exhaust to remove conducting particles </a:t>
+            </a:r>
+            <a:r>
+              <a:rPr lang="en-US" dirty="0" smtClean="0"/>
+              <a:t>from the </a:t>
+            </a:r>
+            <a:r>
+              <a:rPr lang="en-US" dirty="0"/>
+              <a:t>arc column and allow the </a:t>
+            </a:r>
+            <a:r>
+              <a:rPr lang="en-US"/>
+              <a:t>fuse </a:t>
+            </a:r>
+            <a:r>
+              <a:rPr lang="en-US" smtClean="0"/>
+              <a:t>to interrupt </a:t>
+            </a:r>
+            <a:r>
+              <a:rPr lang="en-US" dirty="0"/>
+              <a:t>current at current </a:t>
+            </a:r>
+            <a:r>
+              <a:rPr lang="en-US" dirty="0" smtClean="0"/>
+              <a:t>zero”</a:t>
+            </a:r>
+          </a:p>
+          <a:p>
+            <a:r>
+              <a:rPr lang="en-US" dirty="0" smtClean="0"/>
+              <a:t>“Current </a:t>
+            </a:r>
+            <a:r>
+              <a:rPr lang="en-US" dirty="0"/>
+              <a:t>limiting fuses reduce </a:t>
+            </a:r>
+            <a:r>
+              <a:rPr lang="en-US" dirty="0" smtClean="0"/>
+              <a:t>the magnitude </a:t>
+            </a:r>
+            <a:r>
+              <a:rPr lang="en-US" dirty="0"/>
+              <a:t>and duration of the fault current by introducing a high resistance into the </a:t>
+            </a:r>
+            <a:r>
+              <a:rPr lang="en-US" dirty="0" smtClean="0"/>
+              <a:t>circuit”</a:t>
+            </a:r>
+            <a:endParaRPr lang="en-US" dirty="0"/>
+          </a:p>
+        </p:txBody>
+      </p:sp>
+      <p:sp>
+        <p:nvSpPr>
+          <p:cNvPr id="4" name="Content Placeholder 3"/>
+          <p:cNvSpPr>
+            <a:spLocks noGrp="1"/>
+          </p:cNvSpPr>
+          <p:nvPr>
+            <p:ph sz="half" idx="2"/>
+          </p:nvPr>
+        </p:nvSpPr>
+        <p:spPr/>
+        <p:txBody>
+          <a:bodyPr>
+            <a:normAutofit lnSpcReduction="10000"/>
+          </a:bodyPr>
+          <a:lstStyle/>
+          <a:p>
+            <a:endParaRPr lang="en-US" dirty="0"/>
+          </a:p>
+          <a:p>
+            <a:endParaRPr lang="en-US" dirty="0"/>
+          </a:p>
+        </p:txBody>
+      </p:sp>
+      <p:sp>
+        <p:nvSpPr>
+          <p:cNvPr id="5" name="Rectangle 4"/>
+          <p:cNvSpPr/>
+          <p:nvPr/>
         </p:nvSpPr>
         <p:spPr>
           <a:xfrm>
-            <a:off x="457200" y="1371600"/>
-            <a:ext cx="8229600" cy="4525963"/>
+            <a:off x="609600" y="6106180"/>
+            <a:ext cx="3733800" cy="523220"/>
           </a:xfrm>
+          <a:prstGeom prst="rect">
+            <a:avLst/>
+          </a:prstGeom>
         </p:spPr>
         <p:txBody>
-          <a:bodyPr/>
-          <a:lstStyle/>
-          <a:p>
-            <a:r>
-              <a:rPr lang="en-US" dirty="0" smtClean="0"/>
-              <a:t>Similar </a:t>
-            </a:r>
-            <a:r>
-              <a:rPr lang="en-US" dirty="0"/>
-              <a:t>to switches, but have the ability to break fault current and work autonomously.</a:t>
-            </a:r>
-          </a:p>
-          <a:p>
-            <a:r>
-              <a:rPr lang="en-US" dirty="0"/>
-              <a:t>Do not need to be replaced like fuses and can generally be reset/closed.</a:t>
-            </a:r>
-          </a:p>
-          <a:p>
-            <a:r>
-              <a:rPr lang="en-US" dirty="0"/>
-              <a:t>Typically used for protection rather than a simple disconnect.</a:t>
-            </a:r>
-          </a:p>
-          <a:p>
-            <a:r>
-              <a:rPr lang="en-US" dirty="0"/>
-              <a:t>Older models don’t have communications or complex controls</a:t>
-            </a:r>
-            <a:r>
-              <a:rPr lang="en-US" dirty="0" smtClean="0"/>
-              <a:t>.</a:t>
-            </a:r>
-            <a:endParaRPr lang="en-US" dirty="0"/>
-          </a:p>
-        </p:txBody>
-      </p:sp>
-      <p:sp>
-        <p:nvSpPr>
-          <p:cNvPr id="4" name="Slide Number Placeholder 3"/>
-          <p:cNvSpPr>
-            <a:spLocks noGrp="1"/>
-          </p:cNvSpPr>
-          <p:nvPr>
-            <p:ph type="sldNum" sz="quarter" idx="12"/>
-          </p:nvPr>
-        </p:nvSpPr>
-        <p:spPr/>
-        <p:txBody>
-          <a:bodyPr/>
-          <a:lstStyle/>
-          <a:p>
-            <a:fld id="{B6F15528-21DE-4FAA-801E-634DDDAF4B2B}" type="slidenum">
-              <a:rPr lang="en-US" smtClean="0">
-                <a:solidFill>
-                  <a:prstClr val="black">
-                    <a:tint val="75000"/>
-                  </a:prstClr>
-                </a:solidFill>
-              </a:rPr>
-              <a:pPr/>
-              <a:t>10</a:t>
-            </a:fld>
-            <a:endParaRPr lang="en-US" dirty="0">
-              <a:solidFill>
-                <a:prstClr val="black">
-                  <a:tint val="75000"/>
-                </a:prstClr>
-              </a:solidFill>
-            </a:endParaRPr>
+          <a:bodyPr wrap="square">
+            <a:spAutoFit/>
+          </a:bodyPr>
+          <a:lstStyle/>
+          <a:p>
+            <a:r>
+              <a:rPr lang="en-US" sz="1400" dirty="0" smtClean="0"/>
+              <a:t>IEEE </a:t>
+            </a:r>
+            <a:r>
+              <a:rPr lang="en-US" sz="1400" dirty="0"/>
+              <a:t>Guide for Protective Relay Applications to Distribution Lines</a:t>
+            </a:r>
+            <a:r>
+              <a:rPr lang="en-US" sz="1400" dirty="0" smtClean="0"/>
+              <a:t>, </a:t>
+            </a:r>
+            <a:r>
+              <a:rPr lang="en-US" sz="1400" i="1" dirty="0"/>
+              <a:t>IEEE </a:t>
+            </a:r>
+            <a:r>
+              <a:rPr lang="en-US" sz="1400" i="1" dirty="0" err="1"/>
+              <a:t>Std</a:t>
+            </a:r>
+            <a:r>
+              <a:rPr lang="en-US" sz="1400" i="1" dirty="0"/>
+              <a:t> C37.230-2007</a:t>
+            </a:r>
+            <a:endParaRPr lang="en-US" sz="1400" dirty="0"/>
           </a:p>
         </p:txBody>
       </p:sp>
       <p:pic>
         <p:nvPicPr>
-          <p:cNvPr id="5" name="Picture 4"/>
+          <p:cNvPr id="11265" name="Picture 1"/>
           <p:cNvPicPr>
-            <a:picLocks noChangeAspect="1"/>
+            <a:picLocks noChangeAspect="1" noChangeArrowheads="1"/>
           </p:cNvPicPr>
           <p:nvPr/>
         </p:nvPicPr>
         <p:blipFill>
-          <a:blip r:embed="rId2" cstate="print">
+          <a:blip r:embed="rId2">
             <a:extLst>
               <a:ext uri="{28A0092B-C50C-407E-A947-70E740481C1C}">
                 <a14:useLocalDpi xmlns:a14="http://schemas.microsoft.com/office/drawing/2010/main" val="0"/>
               </a:ext>
             </a:extLst>
           </a:blip>
+          <a:srcRect/>
           <a:stretch>
             <a:fillRect/>
           </a:stretch>
         </p:blipFill>
-        <p:spPr>
+        <p:spPr bwMode="auto">
           <a:xfrm>
-            <a:off x="914400" y="4210050"/>
-            <a:ext cx="3124200" cy="2343150"/>
+            <a:off x="4343400" y="1219200"/>
+            <a:ext cx="4572000" cy="5168649"/>
           </a:xfrm>
           <a:prstGeom prst="rect">
             <a:avLst/>
           </a:prstGeom>
+          <a:noFill/>
           <a:ln>
             <a:noFill/>
           </a:ln>
-          <a:effectLst>
-            <a:outerShdw blurRad="190500" algn="tl" rotWithShape="0">
-              <a:srgbClr val="000000">
-                <a:alpha val="70000"/>
-              </a:srgbClr>
-            </a:outerShdw>
-          </a:effectLst>
-        </p:spPr>
-      </p:pic>
-      <p:pic>
-        <p:nvPicPr>
-          <p:cNvPr id="6" name="Picture 5"/>
-          <p:cNvPicPr>
-            <a:picLocks noChangeAspect="1"/>
-          </p:cNvPicPr>
-          <p:nvPr/>
-        </p:nvPicPr>
-        <p:blipFill>
-          <a:blip r:embed="rId3" cstate="print">
-            <a:extLst>
-              <a:ext uri="{28A0092B-C50C-407E-A947-70E740481C1C}">
-                <a14:useLocalDpi xmlns:a14="http://schemas.microsoft.com/office/drawing/2010/main" val="0"/>
-              </a:ext>
-            </a:extLst>
-          </a:blip>
-          <a:stretch>
-            <a:fillRect/>
-          </a:stretch>
-        </p:blipFill>
-        <p:spPr>
-          <a:xfrm>
-            <a:off x="4953000" y="4181475"/>
-            <a:ext cx="3200400" cy="2400300"/>
-          </a:xfrm>
-          <a:prstGeom prst="rect">
-            <a:avLst/>
-          </a:prstGeom>
-          <a:ln>
-            <a:noFill/>
-          </a:ln>
-          <a:effectLst>
-            <a:outerShdw blurRad="190500" algn="tl" rotWithShape="0">
-              <a:srgbClr val="000000">
-                <a:alpha val="70000"/>
-              </a:srgbClr>
-            </a:outerShdw>
-          </a:effectLst>
+          <a:effectLst/>
+          <a:extLst>
+            <a:ext uri="{909E8E84-426E-40DD-AFC4-6F175D3DCCD1}">
+              <a14:hiddenFill xmlns:a14="http://schemas.microsoft.com/office/drawing/2010/main">
+                <a:solidFill>
+                  <a:schemeClr val="accent1"/>
+                </a:solidFill>
+              </a14:hiddenFill>
+            </a:ext>
+            <a:ext uri="{91240B29-F687-4F45-9708-019B960494DF}">
+              <a14:hiddenLine xmlns:a14="http://schemas.microsoft.com/office/drawing/2010/main" w="9525">
+                <a:solidFill>
+                  <a:schemeClr val="tx1"/>
+                </a:solidFill>
+                <a:miter lim="800000"/>
+                <a:headEnd/>
+                <a:tailEnd/>
+              </a14:hiddenLine>
+            </a:ext>
+            <a:ext uri="{AF507438-7753-43E0-B8FC-AC1667EBCBE1}">
+              <a14:hiddenEffects xmlns:a14="http://schemas.microsoft.com/office/drawing/2010/main">
+                <a:effectLst>
+                  <a:outerShdw dist="35921" dir="2700000" algn="ctr" rotWithShape="0">
+                    <a:schemeClr val="bg2"/>
+                  </a:outerShdw>
+                </a:effectLst>
+              </a14:hiddenEffects>
+            </a:ext>
+          </a:extLst>
         </p:spPr>
       </p:pic>
     </p:spTree>
     <p:extLst>
       <p:ext uri="{BB962C8B-B14F-4D97-AF65-F5344CB8AC3E}">
-        <p14:creationId xmlns:p14="http://schemas.microsoft.com/office/powerpoint/2010/main" val="3350047888"/>
+        <p14:creationId xmlns:p14="http://schemas.microsoft.com/office/powerpoint/2010/main" val="2361889899"/>
       </p:ext>
     </p:extLst>
   </p:cSld>
@@ -2910,7 +2966,7 @@
           <a:p>
             <a:r>
               <a:rPr lang="en-US" dirty="0" smtClean="0"/>
-              <a:t>Circuit Breakers (Continued)</a:t>
+              <a:t>Overcurrent Relays</a:t>
             </a:r>
             <a:endParaRPr lang="en-US" dirty="0"/>
           </a:p>
@@ -2923,78 +2979,550 @@
             <a:spLocks noGrp="1"/>
           </p:cNvSpPr>
           <p:nvPr>
-            <p:ph idx="1"/>
-          </p:nvPr>
-        </p:nvSpPr>
-        <p:spPr/>
-        <p:txBody>
-          <a:bodyPr/>
-          <a:lstStyle/>
-          <a:p>
+            <p:ph sz="half" idx="1"/>
+          </p:nvPr>
+        </p:nvSpPr>
+        <p:spPr>
+          <a:xfrm>
+            <a:off x="76200" y="1447800"/>
+            <a:ext cx="4038600" cy="4525963"/>
+          </a:xfrm>
+        </p:spPr>
+        <p:txBody>
+          <a:bodyPr>
+            <a:normAutofit/>
+          </a:bodyPr>
+          <a:lstStyle/>
+          <a:p>
+            <a:r>
+              <a:rPr lang="en-US" dirty="0" smtClean="0"/>
+              <a:t>Overcurrent relays and fuses are the oldest</a:t>
+            </a:r>
             <a:r>
               <a:rPr lang="en-US" dirty="0"/>
-              <a:t>Newer models have the option to have communications and more complex controls.</a:t>
-            </a:r>
-          </a:p>
-          <a:p>
+              <a:t>, least </a:t>
+            </a:r>
+            <a:r>
+              <a:rPr lang="en-US" dirty="0" smtClean="0"/>
+              <a:t>expensive, </a:t>
+            </a:r>
             <a:r>
               <a:rPr lang="en-US" dirty="0"/>
-              <a:t>Given the ability to control remotely and provide feedback to the control center, circuit breakers are becoming more prevalent for feeder reconfiguration and </a:t>
-            </a:r>
-            <a:r>
-              <a:rPr lang="en-US" dirty="0" smtClean="0"/>
-              <a:t>as bypass components.</a:t>
-            </a:r>
-            <a:endParaRPr lang="en-US" dirty="0"/>
-          </a:p>
-          <a:p>
-            <a:endParaRPr lang="en-US" dirty="0"/>
-          </a:p>
-          <a:p>
-            <a:endParaRPr lang="en-US" dirty="0"/>
-          </a:p>
-        </p:txBody>
-      </p:sp>
-      <p:sp>
-        <p:nvSpPr>
-          <p:cNvPr id="4" name="Slide Number Placeholder 3"/>
-          <p:cNvSpPr>
-            <a:spLocks noGrp="1"/>
-          </p:cNvSpPr>
-          <p:nvPr>
-            <p:ph type="sldNum" sz="quarter" idx="12"/>
-          </p:nvPr>
-        </p:nvSpPr>
-        <p:spPr/>
-        <p:txBody>
-          <a:bodyPr/>
-          <a:lstStyle/>
-          <a:p>
-            <a:fld id="{B6F15528-21DE-4FAA-801E-634DDDAF4B2B}" type="slidenum">
-              <a:rPr lang="en-US" smtClean="0">
+              <a:t>and </a:t>
+            </a:r>
+            <a:r>
+              <a:rPr lang="en-US" dirty="0" smtClean="0"/>
+              <a:t>simplest</a:t>
+            </a:r>
+          </a:p>
+          <a:p>
+            <a:r>
+              <a:rPr lang="en-US" dirty="0" smtClean="0"/>
+              <a:t>Overcurrent relay responds </a:t>
+            </a:r>
+            <a:r>
+              <a:rPr lang="en-US" dirty="0"/>
+              <a:t>to </a:t>
+            </a:r>
+            <a:r>
+              <a:rPr lang="en-US" dirty="0" smtClean="0"/>
+              <a:t>current signals </a:t>
+            </a:r>
+            <a:r>
+              <a:rPr lang="en-US" dirty="0"/>
+              <a:t>from </a:t>
+            </a:r>
+            <a:r>
+              <a:rPr lang="en-US" dirty="0" smtClean="0"/>
+              <a:t>sensors </a:t>
+            </a:r>
+            <a:r>
+              <a:rPr lang="en-US" dirty="0"/>
+              <a:t>and </a:t>
+            </a:r>
+            <a:r>
+              <a:rPr lang="en-US" dirty="0" smtClean="0"/>
+              <a:t>operates a circuit breaker</a:t>
+            </a:r>
+          </a:p>
+          <a:p>
+            <a:endParaRPr lang="en-US" dirty="0"/>
+          </a:p>
+        </p:txBody>
+      </p:sp>
+      <p:pic>
+        <p:nvPicPr>
+          <p:cNvPr id="9218" name="Picture 2"/>
+          <p:cNvPicPr>
+            <a:picLocks noChangeAspect="1" noChangeArrowheads="1"/>
+          </p:cNvPicPr>
+          <p:nvPr/>
+        </p:nvPicPr>
+        <p:blipFill>
+          <a:blip r:embed="rId3">
+            <a:extLst>
+              <a:ext uri="{28A0092B-C50C-407E-A947-70E740481C1C}">
+                <a14:useLocalDpi xmlns:a14="http://schemas.microsoft.com/office/drawing/2010/main" val="0"/>
+              </a:ext>
+            </a:extLst>
+          </a:blip>
+          <a:srcRect/>
+          <a:stretch>
+            <a:fillRect/>
+          </a:stretch>
+        </p:blipFill>
+        <p:spPr bwMode="auto">
+          <a:xfrm>
+            <a:off x="4114800" y="1828800"/>
+            <a:ext cx="5074670" cy="3810255"/>
+          </a:xfrm>
+          <a:prstGeom prst="rect">
+            <a:avLst/>
+          </a:prstGeom>
+          <a:noFill/>
+          <a:ln>
+            <a:noFill/>
+          </a:ln>
+          <a:extLst>
+            <a:ext uri="{909E8E84-426E-40DD-AFC4-6F175D3DCCD1}">
+              <a14:hiddenFill xmlns:a14="http://schemas.microsoft.com/office/drawing/2010/main">
                 <a:solidFill>
-                  <a:prstClr val="black">
-                    <a:tint val="75000"/>
-                  </a:prstClr>
+                  <a:srgbClr val="FFFFFF"/>
                 </a:solidFill>
+              </a14:hiddenFill>
+            </a:ext>
+            <a:ext uri="{91240B29-F687-4F45-9708-019B960494DF}">
+              <a14:hiddenLine xmlns:a14="http://schemas.microsoft.com/office/drawing/2010/main" w="9525">
+                <a:solidFill>
+                  <a:srgbClr val="000000"/>
+                </a:solidFill>
+                <a:miter lim="800000"/>
+                <a:headEnd/>
+                <a:tailEnd/>
+              </a14:hiddenLine>
+            </a:ext>
+          </a:extLst>
+        </p:spPr>
+      </p:pic>
+      <p:sp>
+        <p:nvSpPr>
+          <p:cNvPr id="5" name="Rectangle 3"/>
+          <p:cNvSpPr>
+            <a:spLocks noChangeArrowheads="1"/>
+          </p:cNvSpPr>
+          <p:nvPr/>
+        </p:nvSpPr>
+        <p:spPr bwMode="auto">
+          <a:xfrm>
+            <a:off x="4114800" y="5520194"/>
+            <a:ext cx="5029200" cy="523220"/>
+          </a:xfrm>
+          <a:prstGeom prst="rect">
+            <a:avLst/>
+          </a:prstGeom>
+          <a:noFill/>
+          <a:ln>
+            <a:noFill/>
+          </a:ln>
+          <a:effectLst/>
+          <a:extLst>
+            <a:ext uri="{909E8E84-426E-40DD-AFC4-6F175D3DCCD1}">
+              <a14:hiddenFill xmlns:a14="http://schemas.microsoft.com/office/drawing/2010/main">
+                <a:solidFill>
+                  <a:schemeClr val="accent1"/>
+                </a:solidFill>
+              </a14:hiddenFill>
+            </a:ext>
+            <a:ext uri="{91240B29-F687-4F45-9708-019B960494DF}">
+              <a14:hiddenLine xmlns:a14="http://schemas.microsoft.com/office/drawing/2010/main" w="9525">
+                <a:solidFill>
+                  <a:schemeClr val="tx1"/>
+                </a:solidFill>
+                <a:miter lim="800000"/>
+                <a:headEnd/>
+                <a:tailEnd/>
+              </a14:hiddenLine>
+            </a:ext>
+            <a:ext uri="{AF507438-7753-43E0-B8FC-AC1667EBCBE1}">
+              <a14:hiddenEffects xmlns:a14="http://schemas.microsoft.com/office/drawing/2010/main">
+                <a:effectLst>
+                  <a:outerShdw dist="35921" dir="2700000" algn="ctr" rotWithShape="0">
+                    <a:schemeClr val="bg2"/>
+                  </a:outerShdw>
+                </a:effectLst>
+              </a14:hiddenEffects>
+            </a:ext>
+          </a:extLst>
+        </p:spPr>
+        <p:txBody>
+          <a:bodyPr vert="horz" wrap="square" lIns="91440" tIns="45720" rIns="91440" bIns="45720" numCol="1" anchor="ctr" anchorCtr="0" compatLnSpc="1">
+            <a:prstTxWarp prst="textNoShape">
+              <a:avLst/>
+            </a:prstTxWarp>
+            <a:spAutoFit/>
+          </a:bodyPr>
+          <a:lstStyle/>
+          <a:p>
+            <a:pPr marL="0" marR="0" lvl="0" indent="0" algn="just" defTabSz="914400" rtl="0" eaLnBrk="1" fontAlgn="base" latinLnBrk="0" hangingPunct="1">
+              <a:lnSpc>
+                <a:spcPct val="100000"/>
+              </a:lnSpc>
+              <a:spcBef>
+                <a:spcPct val="0"/>
+              </a:spcBef>
+              <a:spcAft>
+                <a:spcPct val="0"/>
+              </a:spcAft>
+              <a:buClrTx/>
+              <a:buSzTx/>
+              <a:buFontTx/>
+              <a:buNone/>
+              <a:tabLst/>
+            </a:pPr>
+            <a:r>
+              <a:rPr kumimoji="0" lang="en-US" sz="1400" b="0" i="0" u="none" strike="noStrike" cap="none" normalizeH="0" baseline="0" dirty="0" smtClean="0">
+                <a:ln>
+                  <a:noFill/>
+                </a:ln>
+                <a:solidFill>
+                  <a:schemeClr val="tx1"/>
+                </a:solidFill>
+                <a:effectLst/>
+                <a:latin typeface="Arial" pitchFamily="34" charset="0"/>
+                <a:ea typeface="Times New Roman" pitchFamily="18" charset="0"/>
               </a:rPr>
-              <a:pPr/>
-              <a:t>11</a:t>
-            </a:fld>
-            <a:endParaRPr lang="en-US" dirty="0">
+              <a:t>Inverse time-current characteristic of relay according to IEEE standard</a:t>
+            </a:r>
+            <a:r>
+              <a:rPr kumimoji="0" lang="en-US" sz="1400" b="0" i="0" u="none" strike="noStrike" cap="none" normalizeH="0" baseline="30000" dirty="0" smtClean="0">
+                <a:ln>
+                  <a:noFill/>
+                </a:ln>
+                <a:solidFill>
+                  <a:schemeClr val="tx1"/>
+                </a:solidFill>
+                <a:effectLst/>
+                <a:latin typeface="Arial" pitchFamily="34" charset="0"/>
+                <a:ea typeface="Times New Roman" pitchFamily="18" charset="0"/>
+              </a:rPr>
+              <a:t>1 </a:t>
+            </a:r>
+            <a:r>
+              <a:rPr kumimoji="0" lang="en-US" sz="1400" b="0" i="0" u="none" strike="noStrike" cap="none" normalizeH="0" baseline="0" dirty="0" smtClean="0">
+                <a:ln>
+                  <a:noFill/>
+                </a:ln>
+                <a:solidFill>
+                  <a:schemeClr val="tx1"/>
+                </a:solidFill>
+                <a:effectLst/>
+                <a:latin typeface="Arial" pitchFamily="34" charset="0"/>
+                <a:ea typeface="Times New Roman" pitchFamily="18" charset="0"/>
+              </a:rPr>
+              <a:t>and power line used for real-time thermal rating</a:t>
+            </a:r>
+            <a:r>
+              <a:rPr kumimoji="0" lang="en-US" sz="1400" b="0" i="0" u="none" strike="noStrike" cap="none" normalizeH="0" baseline="30000" dirty="0" smtClean="0">
+                <a:ln>
+                  <a:noFill/>
+                </a:ln>
+                <a:solidFill>
+                  <a:schemeClr val="tx1"/>
+                </a:solidFill>
+                <a:effectLst/>
+                <a:latin typeface="Arial" pitchFamily="34" charset="0"/>
+                <a:ea typeface="Times New Roman" pitchFamily="18" charset="0"/>
+              </a:rPr>
+              <a:t>2</a:t>
+            </a:r>
+            <a:endParaRPr kumimoji="0" lang="en-US" sz="4000" b="0" i="0" u="none" strike="noStrike" cap="none" normalizeH="0" baseline="0" dirty="0" smtClean="0">
+              <a:ln>
+                <a:noFill/>
+              </a:ln>
               <a:solidFill>
-                <a:prstClr val="black">
-                  <a:tint val="75000"/>
-                </a:prstClr>
+                <a:schemeClr val="tx1"/>
               </a:solidFill>
+              <a:effectLst/>
+              <a:latin typeface="Arial" pitchFamily="34" charset="0"/>
             </a:endParaRPr>
+          </a:p>
+        </p:txBody>
+      </p:sp>
+      <p:sp>
+        <p:nvSpPr>
+          <p:cNvPr id="8" name="Rectangle 7"/>
+          <p:cNvSpPr/>
+          <p:nvPr/>
+        </p:nvSpPr>
+        <p:spPr>
+          <a:xfrm>
+            <a:off x="457200" y="6135469"/>
+            <a:ext cx="8305800" cy="830997"/>
+          </a:xfrm>
+          <a:prstGeom prst="rect">
+            <a:avLst/>
+          </a:prstGeom>
+        </p:spPr>
+        <p:txBody>
+          <a:bodyPr wrap="square">
+            <a:spAutoFit/>
+          </a:bodyPr>
+          <a:lstStyle/>
+          <a:p>
+            <a:pPr lvl="0"/>
+            <a:r>
+              <a:rPr lang="en-US" sz="1200" dirty="0"/>
+              <a:t>1</a:t>
+            </a:r>
+            <a:r>
+              <a:rPr lang="en-US" sz="1200" dirty="0" smtClean="0"/>
+              <a:t>: "IEEE </a:t>
+            </a:r>
+            <a:r>
+              <a:rPr lang="en-US" sz="1200" dirty="0"/>
+              <a:t>standard inverse-time characteristic equations for overcurrent relays," IEEE </a:t>
+            </a:r>
+            <a:r>
+              <a:rPr lang="en-US" sz="1200" dirty="0" smtClean="0"/>
+              <a:t>Trans. </a:t>
+            </a:r>
+            <a:r>
+              <a:rPr lang="en-US" sz="1200" dirty="0"/>
+              <a:t>on Power Delivery, </a:t>
+            </a:r>
+            <a:r>
+              <a:rPr lang="en-US" sz="1200" dirty="0" smtClean="0"/>
+              <a:t>Jul </a:t>
+            </a:r>
+            <a:r>
+              <a:rPr lang="en-US" sz="1200" dirty="0"/>
+              <a:t>1999</a:t>
+            </a:r>
+            <a:r>
+              <a:rPr lang="en-US" sz="1200" dirty="0" smtClean="0"/>
+              <a:t>.</a:t>
+            </a:r>
+          </a:p>
+          <a:p>
+            <a:r>
+              <a:rPr lang="en-US" sz="1200" dirty="0" smtClean="0"/>
+              <a:t>2: </a:t>
+            </a:r>
+            <a:r>
+              <a:rPr lang="en-US" sz="1200" dirty="0"/>
+              <a:t>M.W. Davis, "A new thermal rating approach: The real time thermal rating system for strategic overhead conductor transmission lines - Part I," IEEE Trans. on Power Apparatus and Systems, May 1977</a:t>
+            </a:r>
+          </a:p>
+          <a:p>
+            <a:pPr lvl="0"/>
+            <a:endParaRPr lang="en-US" sz="1200" dirty="0"/>
+          </a:p>
+        </p:txBody>
+      </p:sp>
+      <p:sp>
+        <p:nvSpPr>
+          <p:cNvPr id="9" name="Rectangle 5"/>
+          <p:cNvSpPr>
+            <a:spLocks noChangeArrowheads="1"/>
+          </p:cNvSpPr>
+          <p:nvPr/>
+        </p:nvSpPr>
+        <p:spPr bwMode="auto">
+          <a:xfrm>
+            <a:off x="0" y="0"/>
+            <a:ext cx="9144000" cy="0"/>
+          </a:xfrm>
+          <a:prstGeom prst="rect">
+            <a:avLst/>
+          </a:prstGeom>
+          <a:noFill/>
+          <a:ln>
+            <a:noFill/>
+          </a:ln>
+          <a:effectLst/>
+          <a:extLst>
+            <a:ext uri="{909E8E84-426E-40DD-AFC4-6F175D3DCCD1}">
+              <a14:hiddenFill xmlns:a14="http://schemas.microsoft.com/office/drawing/2010/main">
+                <a:solidFill>
+                  <a:schemeClr val="accent1"/>
+                </a:solidFill>
+              </a14:hiddenFill>
+            </a:ext>
+            <a:ext uri="{91240B29-F687-4F45-9708-019B960494DF}">
+              <a14:hiddenLine xmlns:a14="http://schemas.microsoft.com/office/drawing/2010/main" w="9525">
+                <a:solidFill>
+                  <a:schemeClr val="tx1"/>
+                </a:solidFill>
+                <a:miter lim="800000"/>
+                <a:headEnd/>
+                <a:tailEnd/>
+              </a14:hiddenLine>
+            </a:ext>
+            <a:ext uri="{AF507438-7753-43E0-B8FC-AC1667EBCBE1}">
+              <a14:hiddenEffects xmlns:a14="http://schemas.microsoft.com/office/drawing/2010/main">
+                <a:effectLst>
+                  <a:outerShdw dist="35921" dir="2700000" algn="ctr" rotWithShape="0">
+                    <a:schemeClr val="bg2"/>
+                  </a:outerShdw>
+                </a:effectLst>
+              </a14:hiddenEffects>
+            </a:ext>
+          </a:extLst>
+        </p:spPr>
+        <p:txBody>
+          <a:bodyPr vert="horz" wrap="none" lIns="91440" tIns="45720" rIns="91440" bIns="45720" numCol="1" anchor="ctr" anchorCtr="0" compatLnSpc="1">
+            <a:prstTxWarp prst="textNoShape">
+              <a:avLst/>
+            </a:prstTxWarp>
+            <a:spAutoFit/>
+          </a:bodyPr>
+          <a:lstStyle/>
+          <a:p>
+            <a:endParaRPr lang="en-US"/>
+          </a:p>
+        </p:txBody>
+      </p:sp>
+      <p:graphicFrame>
+        <p:nvGraphicFramePr>
+          <p:cNvPr id="10" name="Object 9"/>
+          <p:cNvGraphicFramePr>
+            <a:graphicFrameLocks noChangeAspect="1"/>
+          </p:cNvGraphicFramePr>
+          <p:nvPr>
+            <p:extLst>
+              <p:ext uri="{D42A27DB-BD31-4B8C-83A1-F6EECF244321}">
+                <p14:modId xmlns:p14="http://schemas.microsoft.com/office/powerpoint/2010/main" val="4291922730"/>
+              </p:ext>
+            </p:extLst>
+          </p:nvPr>
+        </p:nvGraphicFramePr>
+        <p:xfrm>
+          <a:off x="990600" y="4114800"/>
+          <a:ext cx="2113577" cy="609600"/>
+        </p:xfrm>
+        <a:graphic>
+          <a:graphicData uri="http://schemas.openxmlformats.org/presentationml/2006/ole">
+            <mc:AlternateContent xmlns:mc="http://schemas.openxmlformats.org/markup-compatibility/2006">
+              <mc:Choice xmlns:v="urn:schemas-microsoft-com:vml" Requires="v">
+                <p:oleObj spid="_x0000_s9243" name="Equation" r:id="rId4" imgW="1511300" imgH="431800" progId="Equation.DSMT4">
+                  <p:embed/>
+                </p:oleObj>
+              </mc:Choice>
+              <mc:Fallback>
+                <p:oleObj name="Equation" r:id="rId4" imgW="1511300" imgH="431800" progId="Equation.DSMT4">
+                  <p:embed/>
+                  <p:pic>
+                    <p:nvPicPr>
+                      <p:cNvPr id="0" name="Object 4"/>
+                      <p:cNvPicPr>
+                        <a:picLocks noChangeAspect="1" noChangeArrowheads="1"/>
+                      </p:cNvPicPr>
+                      <p:nvPr/>
+                    </p:nvPicPr>
+                    <p:blipFill>
+                      <a:blip r:embed="rId5">
+                        <a:extLst>
+                          <a:ext uri="{28A0092B-C50C-407E-A947-70E740481C1C}">
+                            <a14:useLocalDpi xmlns:a14="http://schemas.microsoft.com/office/drawing/2010/main" val="0"/>
+                          </a:ext>
+                        </a:extLst>
+                      </a:blip>
+                      <a:srcRect/>
+                      <a:stretch>
+                        <a:fillRect/>
+                      </a:stretch>
+                    </p:blipFill>
+                    <p:spPr bwMode="auto">
+                      <a:xfrm>
+                        <a:off x="990600" y="4114800"/>
+                        <a:ext cx="2113577" cy="609600"/>
+                      </a:xfrm>
+                      <a:prstGeom prst="rect">
+                        <a:avLst/>
+                      </a:prstGeom>
+                      <a:noFill/>
+                    </p:spPr>
+                  </p:pic>
+                </p:oleObj>
+              </mc:Fallback>
+            </mc:AlternateContent>
+          </a:graphicData>
+        </a:graphic>
+      </p:graphicFrame>
+      <p:pic>
+        <p:nvPicPr>
+          <p:cNvPr id="12" name="Picture 6"/>
+          <p:cNvPicPr>
+            <a:picLocks noChangeAspect="1" noChangeArrowheads="1"/>
+          </p:cNvPicPr>
+          <p:nvPr/>
+        </p:nvPicPr>
+        <p:blipFill>
+          <a:blip r:embed="rId6" cstate="print"/>
+          <a:srcRect/>
+          <a:stretch>
+            <a:fillRect/>
+          </a:stretch>
+        </p:blipFill>
+        <p:spPr bwMode="auto">
+          <a:xfrm>
+            <a:off x="381000" y="4750263"/>
+            <a:ext cx="3581400" cy="1115518"/>
+          </a:xfrm>
+          <a:prstGeom prst="rect">
+            <a:avLst/>
+          </a:prstGeom>
+          <a:noFill/>
+          <a:ln w="9525">
+            <a:noFill/>
+            <a:miter lim="800000"/>
+            <a:headEnd/>
+            <a:tailEnd/>
+          </a:ln>
+        </p:spPr>
+      </p:pic>
+      <p:sp>
+        <p:nvSpPr>
+          <p:cNvPr id="11" name="TextBox 10"/>
+          <p:cNvSpPr txBox="1"/>
+          <p:nvPr/>
+        </p:nvSpPr>
+        <p:spPr>
+          <a:xfrm>
+            <a:off x="1471796" y="5864423"/>
+            <a:ext cx="1508811" cy="307777"/>
+          </a:xfrm>
+          <a:prstGeom prst="rect">
+            <a:avLst/>
+          </a:prstGeom>
+          <a:noFill/>
+        </p:spPr>
+        <p:txBody>
+          <a:bodyPr wrap="none" rtlCol="0">
+            <a:spAutoFit/>
+          </a:bodyPr>
+          <a:lstStyle/>
+          <a:p>
+            <a:r>
+              <a:rPr lang="en-US" sz="1400" dirty="0" smtClean="0"/>
+              <a:t>(Extracted from </a:t>
+            </a:r>
+            <a:r>
+              <a:rPr lang="en-US" sz="1400" baseline="30000" dirty="0" smtClean="0"/>
+              <a:t>1</a:t>
+            </a:r>
+            <a:r>
+              <a:rPr lang="en-US" sz="1400" dirty="0" smtClean="0"/>
+              <a:t>)</a:t>
+            </a:r>
+            <a:endParaRPr lang="en-US" dirty="0"/>
           </a:p>
         </p:txBody>
       </p:sp>
     </p:spTree>
     <p:extLst>
       <p:ext uri="{BB962C8B-B14F-4D97-AF65-F5344CB8AC3E}">
-        <p14:creationId xmlns:p14="http://schemas.microsoft.com/office/powerpoint/2010/main" val="3130473962"/>
+        <p14:creationId xmlns:p14="http://schemas.microsoft.com/office/powerpoint/2010/main" val="1472949330"/>
       </p:ext>
     </p:extLst>
   </p:cSld>
@@ -3239,7 +3767,7 @@
           <a:p>
             <a:r>
               <a:rPr lang="en-US" dirty="0" smtClean="0"/>
-              <a:t>Reclosers (Continued)</a:t>
+              <a:t>Reclosers</a:t>
             </a:r>
             <a:endParaRPr lang="en-US" dirty="0"/>
           </a:p>
@@ -3262,7 +3790,15 @@
           <a:p>
             <a:r>
               <a:rPr lang="en-US" dirty="0"/>
-              <a:t>With the development of the Smart Grid, reclosers are starting to incorporate more advanced metering and reporting capabilities.</a:t>
+              <a:t>With the development of the Smart Grid, </a:t>
+            </a:r>
+            <a:r>
+              <a:rPr lang="en-US" dirty="0" err="1"/>
+              <a:t>reclosers</a:t>
+            </a:r>
+            <a:r>
+              <a:rPr lang="en-US" dirty="0"/>
+              <a:t> are starting to incorporate more advanced metering and reporting capabilities.</a:t>
             </a:r>
           </a:p>
           <a:p>
@@ -3492,7 +4028,7 @@
           <a:lstStyle/>
           <a:p>
             <a:r>
-              <a:rPr lang="en-US" dirty="0" err="1" smtClean="0"/>
+              <a:rPr lang="en-US" dirty="0" smtClean="0"/>
               <a:t>Reclosers</a:t>
             </a:r>
             <a:endParaRPr lang="en-US" dirty="0"/>
@@ -4188,7 +4724,7 @@
           <a:p>
             <a:r>
               <a:rPr lang="en-US" dirty="0" smtClean="0"/>
-              <a:t>Coordination of protection schemes</a:t>
+              <a:t>Coordination of Protection Schemes</a:t>
             </a:r>
             <a:endParaRPr lang="en-US" dirty="0"/>
           </a:p>
@@ -4312,7 +4848,7 @@
           <a:p>
             <a:r>
               <a:rPr lang="en-US" dirty="0" smtClean="0"/>
-              <a:t>Coordination schemes in radial network (1)</a:t>
+              <a:t>Coordination Schemes in Radial Network</a:t>
             </a:r>
             <a:endParaRPr lang="en-US" dirty="0"/>
           </a:p>
@@ -4335,7 +4871,7 @@
           <a:p>
             <a:r>
               <a:rPr lang="en-US" dirty="0" smtClean="0"/>
-              <a:t>Tow overcurrent devices</a:t>
+              <a:t>Two overcurrent devices</a:t>
             </a:r>
             <a:endParaRPr lang="en-US" dirty="0"/>
           </a:p>
@@ -4603,10 +5139,10 @@
   </p:clrMapOvr>
   <mc:AlternateContent xmlns:mc="http://schemas.openxmlformats.org/markup-compatibility/2006" xmlns:p14="http://schemas.microsoft.com/office/powerpoint/2010/main">
     <mc:Choice Requires="p14">
-      <p:transition spd="slow" p14:dur="2000" advTm="2756"/>
+      <p:transition spd="slow" p14:dur="2000"/>
     </mc:Choice>
     <mc:Fallback xmlns="">
-      <p:transition spd="slow" advTm="2756"/>
+      <p:transition spd="slow"/>
     </mc:Fallback>
   </mc:AlternateContent>
   <p:timing>
@@ -4657,15 +5193,15 @@
             </a:r>
             <a:r>
               <a:rPr lang="en-US" dirty="0" smtClean="0"/>
-              <a:t>of </a:t>
+              <a:t>Schemes </a:t>
             </a:r>
             <a:r>
               <a:rPr lang="en-US" dirty="0"/>
-              <a:t>in radial network </a:t>
-            </a:r>
-            <a:r>
-              <a:rPr lang="en-US" dirty="0" smtClean="0"/>
-              <a:t>(2)</a:t>
+              <a:t>in </a:t>
+            </a:r>
+            <a:r>
+              <a:rPr lang="en-US" dirty="0" smtClean="0"/>
+              <a:t>Radial Network</a:t>
             </a:r>
             <a:endParaRPr lang="en-US" dirty="0"/>
           </a:p>
@@ -4687,8 +5223,12 @@
           <a:lstStyle/>
           <a:p>
             <a:r>
+              <a:rPr lang="en-US" dirty="0" smtClean="0"/>
+              <a:t>Fuse</a:t>
+            </a:r>
+            <a:r>
               <a:rPr lang="en-US" dirty="0"/>
-              <a:t>fuse, </a:t>
+              <a:t>, </a:t>
             </a:r>
             <a:r>
               <a:rPr lang="en-US" dirty="0" err="1"/>
@@ -4887,11 +5427,19 @@
           <a:p>
             <a:r>
               <a:rPr lang="en-US" dirty="0"/>
-              <a:t>Coordination schemes in radial network </a:t>
-            </a:r>
-            <a:r>
-              <a:rPr lang="en-US" dirty="0" smtClean="0"/>
-              <a:t>(3)</a:t>
+              <a:t>Coordination </a:t>
+            </a:r>
+            <a:r>
+              <a:rPr lang="en-US" dirty="0" smtClean="0"/>
+              <a:t>Schemes </a:t>
+            </a:r>
+            <a:r>
+              <a:rPr lang="en-US" dirty="0"/>
+              <a:t>in </a:t>
+            </a:r>
+            <a:r>
+              <a:rPr lang="en-US" dirty="0" smtClean="0"/>
+              <a:t>Radial Network</a:t>
             </a:r>
             <a:endParaRPr lang="en-US" dirty="0"/>
           </a:p>
@@ -5190,15 +5738,15 @@
           <a:p>
             <a:r>
               <a:rPr lang="en-US" dirty="0" smtClean="0"/>
-              <a:t>Coordination </a:t>
+              <a:t>Coordination Schemes </a:t>
             </a:r>
             <a:r>
               <a:rPr lang="en-US" dirty="0"/>
-              <a:t>schemes in radial </a:t>
-            </a:r>
-            <a:r>
-              <a:rPr lang="en-US" dirty="0" smtClean="0"/>
-              <a:t>network (4)</a:t>
+              <a:t>in </a:t>
+            </a:r>
+            <a:r>
+              <a:rPr lang="en-US" dirty="0" smtClean="0"/>
+              <a:t>Radial Network</a:t>
             </a:r>
             <a:endParaRPr lang="en-US" dirty="0"/>
           </a:p>
@@ -5487,8 +6035,21 @@
           <a:p>
             <a:r>
               <a:rPr lang="en-US" dirty="0"/>
-              <a:t>Coordination schemes in radial network (4)</a:t>
-            </a:r>
+              <a:t>Coordination </a:t>
+            </a:r>
+            <a:r>
+              <a:rPr lang="en-US" dirty="0" smtClean="0"/>
+              <a:t>Schemes </a:t>
+            </a:r>
+            <a:r>
+              <a:rPr lang="en-US" dirty="0"/>
+              <a:t>in </a:t>
+            </a:r>
+            <a:r>
+              <a:rPr lang="en-US" dirty="0" smtClean="0"/>
+              <a:t>Radial Network</a:t>
+            </a:r>
+            <a:endParaRPr lang="en-US" dirty="0"/>
           </a:p>
         </p:txBody>
       </p:sp>
@@ -5724,7 +6285,7 @@
           <a:p>
             <a:r>
               <a:rPr lang="en-US" dirty="0" smtClean="0"/>
-              <a:t>Voltage scheme</a:t>
+              <a:t>Voltage Scheme</a:t>
             </a:r>
             <a:endParaRPr lang="en-US" dirty="0"/>
           </a:p>
@@ -5991,7 +6552,7 @@
           <a:p>
             <a:r>
               <a:rPr lang="en-US" dirty="0" smtClean="0"/>
-              <a:t>Overcurrent protection schemes</a:t>
+              <a:t>Overcurrent Protection Schemes</a:t>
             </a:r>
             <a:endParaRPr lang="en-US" dirty="0"/>
           </a:p>
@@ -6700,11 +7261,11 @@
             </a:r>
             <a:r>
               <a:rPr lang="en-US" dirty="0" err="1" smtClean="0"/>
-              <a:t>recloser</a:t>
-            </a:r>
-            <a:r>
-              <a:rPr lang="en-US" dirty="0" smtClean="0"/>
-              <a:t> and large transformer</a:t>
+              <a:t>Recloser</a:t>
+            </a:r>
+            <a:r>
+              <a:rPr lang="en-US" dirty="0" smtClean="0"/>
+              <a:t> and Large Transformer</a:t>
             </a:r>
             <a:endParaRPr lang="en-US" dirty="0"/>
           </a:p>
@@ -7289,7 +7850,7 @@
           <a:p>
             <a:r>
               <a:rPr lang="en-US" dirty="0" smtClean="0"/>
-              <a:t>Loop scheme</a:t>
+              <a:t>Loop Scheme</a:t>
             </a:r>
             <a:endParaRPr lang="en-US" dirty="0"/>
           </a:p>
@@ -7662,7 +8223,7 @@
           <a:p>
             <a:r>
               <a:rPr lang="en-US" dirty="0" smtClean="0"/>
-              <a:t>Protection coordination in meshed circuits</a:t>
+              <a:t>Protection Coordination in Meshed Circuits</a:t>
             </a:r>
             <a:endParaRPr lang="en-US" dirty="0"/>
           </a:p>
@@ -7762,7 +8323,7 @@
           <a:p>
             <a:r>
               <a:rPr lang="en-US" dirty="0" smtClean="0"/>
-              <a:t>Directional overcurrent relays</a:t>
+              <a:t>Directional Overcurrent Relays</a:t>
             </a:r>
             <a:endParaRPr lang="en-US" dirty="0"/>
           </a:p>
@@ -7845,7 +8406,7 @@
           <a:p>
             <a:r>
               <a:rPr lang="en-US" dirty="0" smtClean="0"/>
-              <a:t>Protection schemes for bidirectional power flow</a:t>
+              <a:t>Protection Schemes for Bidirectional Power Flow</a:t>
             </a:r>
             <a:endParaRPr lang="en-US" dirty="0"/>
           </a:p>
@@ -7928,7 +8489,7 @@
           <a:p>
             <a:r>
               <a:rPr lang="en-US" dirty="0" smtClean="0"/>
-              <a:t>Protection schemes with distributed resources</a:t>
+              <a:t>Protection Schemes with Distributed Resources</a:t>
             </a:r>
             <a:endParaRPr lang="en-US" dirty="0"/>
           </a:p>
@@ -8218,7 +8779,7 @@
             <a:pPr lvl="1"/>
             <a:r>
               <a:rPr lang="en-US" dirty="0" smtClean="0"/>
-              <a:t>Losses and relieve line overloads</a:t>
+              <a:t>Reduce losses and relieve line overloads</a:t>
             </a:r>
           </a:p>
           <a:p>
@@ -8240,7 +8801,7 @@
             <a:pPr lvl="1"/>
             <a:r>
               <a:rPr lang="en-US" dirty="0" smtClean="0"/>
-              <a:t>Losses and voltage profile</a:t>
+              <a:t>Reduce losses and improve the voltage profile</a:t>
             </a:r>
             <a:endParaRPr lang="en-US" dirty="0"/>
           </a:p>
@@ -8248,7 +8809,7 @@
             <a:pPr lvl="1"/>
             <a:r>
               <a:rPr lang="en-US" dirty="0" smtClean="0"/>
-              <a:t>Restoration?</a:t>
+              <a:t>Restore portions of a feeder by routing around a fault</a:t>
             </a:r>
             <a:endParaRPr lang="en-US" dirty="0"/>
           </a:p>
@@ -8332,7 +8893,7 @@
           <a:p>
             <a:r>
               <a:rPr lang="en-US" dirty="0" smtClean="0"/>
-              <a:t>Radial reconfiguration problem</a:t>
+              <a:t>Radial Reconfiguration Problem</a:t>
             </a:r>
             <a:endParaRPr lang="en-US" dirty="0"/>
           </a:p>
@@ -8357,7 +8918,7 @@
           <a:p>
             <a:r>
               <a:rPr lang="en-US" dirty="0" smtClean="0"/>
-              <a:t>Switches are open and close to reconfigure the circuit maintaining radial configuration</a:t>
+              <a:t>Switches are opened and closed to reconfigure the circuit, maintaining radial configuration</a:t>
             </a:r>
           </a:p>
           <a:p>
@@ -8375,7 +8936,7 @@
           <a:p>
             <a:r>
               <a:rPr lang="en-US" dirty="0" smtClean="0"/>
-              <a:t>Optimization problem: Find “spanning tree” that minimize objective function while satisfying voltage constraints, capacity constraints and reliability constraints</a:t>
+              <a:t>Optimization problem: Find “spanning tree” that minimizes an objective function, while satisfying voltage constraints, capacity constraints, and reliability constraints</a:t>
             </a:r>
           </a:p>
           <a:p>
@@ -8806,7 +9367,7 @@
           <a:p>
             <a:r>
               <a:rPr lang="en-US" dirty="0" smtClean="0"/>
-              <a:t>Solution of reconfiguration problem</a:t>
+              <a:t>Solution of Reconfiguration Problem</a:t>
             </a:r>
             <a:endParaRPr lang="en-US" dirty="0"/>
           </a:p>
@@ -9692,13 +10253,19 @@
               <a:rPr lang="en-US" dirty="0" smtClean="0"/>
               <a:t>Fuses</a:t>
             </a:r>
-            <a:endParaRPr lang="en-US" dirty="0"/>
-          </a:p>
-          <a:p>
-            <a:r>
-              <a:rPr lang="en-US" dirty="0"/>
+          </a:p>
+          <a:p>
+            <a:r>
+              <a:rPr lang="en-US" dirty="0" smtClean="0"/>
+              <a:t>Overcurrent Relays</a:t>
+            </a:r>
+          </a:p>
+          <a:p>
+            <a:r>
+              <a:rPr lang="en-US" dirty="0" smtClean="0"/>
               <a:t>Reclosers</a:t>
             </a:r>
+            <a:endParaRPr lang="en-US" dirty="0"/>
           </a:p>
           <a:p>
             <a:r>
@@ -10805,11 +11372,7 @@
           <a:p>
             <a:r>
               <a:rPr lang="en-US" dirty="0" smtClean="0"/>
-              <a:t>Conclusion of Module </a:t>
-            </a:r>
-            <a:r>
-              <a:rPr lang="en-US" dirty="0" smtClean="0"/>
-              <a:t>9: Automated Switching and Reconfiguration</a:t>
+              <a:t>Conclusion of Module 9: Automated Switching and Reconfiguration</a:t>
             </a:r>
             <a:endParaRPr lang="en-US" dirty="0"/>
           </a:p>
@@ -10818,7 +11381,7 @@
     </p:spTree>
     <p:extLst>
       <p:ext uri="{BB962C8B-B14F-4D97-AF65-F5344CB8AC3E}">
-        <p14:creationId xmlns:p14="http://schemas.microsoft.com/office/powerpoint/2010/main" val="727273272"/>
+        <p14:creationId xmlns:p14="http://schemas.microsoft.com/office/powerpoint/2010/main" val="3722709558"/>
       </p:ext>
     </p:extLst>
   </p:cSld>
@@ -10869,7 +11432,7 @@
           <a:p>
             <a:r>
               <a:rPr lang="en-US" dirty="0" smtClean="0"/>
-              <a:t>Fuses</a:t>
+              <a:t>Switches</a:t>
             </a:r>
             <a:endParaRPr lang="en-US" dirty="0"/>
           </a:p>
@@ -10882,79 +11445,26 @@
             <a:spLocks noGrp="1"/>
           </p:cNvSpPr>
           <p:nvPr>
-            <p:ph sz="half" idx="1"/>
-          </p:nvPr>
-        </p:nvSpPr>
-        <p:spPr/>
-        <p:txBody>
-          <a:bodyPr>
-            <a:normAutofit/>
-          </a:bodyPr>
-          <a:lstStyle/>
-          <a:p>
-            <a:r>
-              <a:rPr lang="en-US" dirty="0" smtClean="0"/>
-              <a:t>Protection device </a:t>
-            </a:r>
+            <p:ph idx="1"/>
+          </p:nvPr>
+        </p:nvSpPr>
+        <p:spPr>
+          <a:xfrm>
+            <a:off x="533400" y="1600200"/>
+            <a:ext cx="3886200" cy="1676400"/>
+          </a:xfrm>
+        </p:spPr>
+        <p:txBody>
+          <a:bodyPr/>
+          <a:lstStyle/>
+          <a:p>
             <a:r>
               <a:rPr lang="en-US" dirty="0"/>
-              <a:t>u</a:t>
-            </a:r>
-            <a:r>
-              <a:rPr lang="en-US" dirty="0" smtClean="0"/>
-              <a:t>sed </a:t>
-            </a:r>
-            <a:r>
-              <a:rPr lang="en-US" dirty="0"/>
-              <a:t>to break fault </a:t>
-            </a:r>
-            <a:r>
-              <a:rPr lang="en-US" dirty="0" smtClean="0"/>
-              <a:t>current.</a:t>
-            </a:r>
-          </a:p>
-          <a:p>
-            <a:r>
-              <a:rPr lang="en-US" dirty="0" smtClean="0"/>
-              <a:t>Removes </a:t>
-            </a:r>
-            <a:r>
-              <a:rPr lang="en-US" dirty="0"/>
-              <a:t>faulted </a:t>
-            </a:r>
-            <a:r>
-              <a:rPr lang="en-US" dirty="0" smtClean="0"/>
-              <a:t>sections of a feeder from the system.</a:t>
-            </a:r>
-            <a:endParaRPr lang="en-US" dirty="0"/>
-          </a:p>
-          <a:p>
-            <a:r>
-              <a:rPr lang="en-US" dirty="0"/>
-              <a:t>Need to be manually replaced </a:t>
-            </a:r>
-            <a:r>
-              <a:rPr lang="en-US" dirty="0" smtClean="0"/>
-              <a:t>because </a:t>
-            </a:r>
-            <a:r>
-              <a:rPr lang="en-US" dirty="0"/>
-              <a:t>the fuse sacrifices itself to protect the feeder and its components</a:t>
+              <a:t>Switches are simple devices that typically do not have any controls or communication</a:t>
             </a:r>
             <a:r>
               <a:rPr lang="en-US" dirty="0" smtClean="0"/>
               <a:t>.</a:t>
-            </a:r>
-          </a:p>
-          <a:p>
-            <a:pPr lvl="1"/>
-            <a:r>
-              <a:rPr lang="en-US" dirty="0"/>
-              <a:t> </a:t>
-            </a:r>
-            <a:r>
-              <a:rPr lang="en-US" dirty="0" smtClean="0"/>
-              <a:t>Fuse designed to ‘blow’ within specified time for given value of fault current. </a:t>
             </a:r>
             <a:endParaRPr lang="en-US" dirty="0"/>
           </a:p>
@@ -10985,1060 +11495,6 @@
               </a:rPr>
               <a:pPr/>
               <a:t>5</a:t>
-            </a:fld>
-            <a:endParaRPr lang="en-US" dirty="0">
-              <a:solidFill>
-                <a:prstClr val="black">
-                  <a:tint val="75000"/>
-                </a:prstClr>
-              </a:solidFill>
-            </a:endParaRPr>
-          </a:p>
-        </p:txBody>
-      </p:sp>
-      <p:pic>
-        <p:nvPicPr>
-          <p:cNvPr id="7" name="Content Placeholder 6"/>
-          <p:cNvPicPr>
-            <a:picLocks noGrp="1" noChangeAspect="1"/>
-          </p:cNvPicPr>
-          <p:nvPr>
-            <p:ph sz="half" idx="2"/>
-          </p:nvPr>
-        </p:nvPicPr>
-        <p:blipFill rotWithShape="1">
-          <a:blip r:embed="rId2" cstate="print">
-            <a:extLst>
-              <a:ext uri="{28A0092B-C50C-407E-A947-70E740481C1C}">
-                <a14:useLocalDpi xmlns:a14="http://schemas.microsoft.com/office/drawing/2010/main" val="0"/>
-              </a:ext>
-            </a:extLst>
-          </a:blip>
-          <a:srcRect l="30638" r="10531"/>
-          <a:stretch/>
-        </p:blipFill>
-        <p:spPr>
-          <a:xfrm>
-            <a:off x="4892387" y="1600200"/>
-            <a:ext cx="3550225" cy="4525963"/>
-          </a:xfrm>
-          <a:prstGeom prst="rect">
-            <a:avLst/>
-          </a:prstGeom>
-          <a:ln>
-            <a:noFill/>
-          </a:ln>
-          <a:effectLst>
-            <a:outerShdw blurRad="190500" algn="tl" rotWithShape="0">
-              <a:srgbClr val="000000">
-                <a:alpha val="70000"/>
-              </a:srgbClr>
-            </a:outerShdw>
-          </a:effectLst>
-        </p:spPr>
-      </p:pic>
-    </p:spTree>
-    <p:extLst>
-      <p:ext uri="{BB962C8B-B14F-4D97-AF65-F5344CB8AC3E}">
-        <p14:creationId xmlns:p14="http://schemas.microsoft.com/office/powerpoint/2010/main" val="1305026423"/>
-      </p:ext>
-    </p:extLst>
-  </p:cSld>
-  <p:clrMapOvr>
-    <a:masterClrMapping/>
-  </p:clrMapOvr>
-  <p:timing>
-    <p:tnLst>
-      <p:par>
-        <p:cTn id="1" dur="indefinite" restart="never" nodeType="tmRoot"/>
-      </p:par>
-    </p:tnLst>
-  </p:timing>
-</p:sld>
-</file>
-
-<file path=ppt/slides/slide6.xml><?xml version="1.0" encoding="utf-8"?>
-<p:sld xmlns:a="http://schemas.openxmlformats.org/drawingml/2006/main" xmlns:r="http://schemas.openxmlformats.org/officeDocument/2006/relationships" xmlns:p="http://schemas.openxmlformats.org/presentationml/2006/main">
-  <p:cSld>
-    <p:spTree>
-      <p:nvGrpSpPr>
-        <p:cNvPr id="1" name=""/>
-        <p:cNvGrpSpPr/>
-        <p:nvPr/>
-      </p:nvGrpSpPr>
-      <p:grpSpPr>
-        <a:xfrm>
-          <a:off x="0" y="0"/>
-          <a:ext cx="0" cy="0"/>
-          <a:chOff x="0" y="0"/>
-          <a:chExt cx="0" cy="0"/>
-        </a:xfrm>
-      </p:grpSpPr>
-      <p:sp>
-        <p:nvSpPr>
-          <p:cNvPr id="2" name="Title 1"/>
-          <p:cNvSpPr>
-            <a:spLocks noGrp="1"/>
-          </p:cNvSpPr>
-          <p:nvPr>
-            <p:ph type="title"/>
-          </p:nvPr>
-        </p:nvSpPr>
-        <p:spPr/>
-        <p:txBody>
-          <a:bodyPr/>
-          <a:lstStyle/>
-          <a:p>
-            <a:r>
-              <a:rPr lang="en-US" dirty="0" smtClean="0"/>
-              <a:t>Fuses (2)</a:t>
-            </a:r>
-            <a:endParaRPr lang="en-US" dirty="0"/>
-          </a:p>
-        </p:txBody>
-      </p:sp>
-      <p:sp>
-        <p:nvSpPr>
-          <p:cNvPr id="3" name="Content Placeholder 2"/>
-          <p:cNvSpPr>
-            <a:spLocks noGrp="1"/>
-          </p:cNvSpPr>
-          <p:nvPr>
-            <p:ph sz="half" idx="1"/>
-          </p:nvPr>
-        </p:nvSpPr>
-        <p:spPr/>
-        <p:txBody>
-          <a:bodyPr>
-            <a:normAutofit lnSpcReduction="10000"/>
-          </a:bodyPr>
-          <a:lstStyle/>
-          <a:p>
-            <a:r>
-              <a:rPr lang="en-US" dirty="0" smtClean="0"/>
-              <a:t>Two types: expulsion </a:t>
-            </a:r>
-            <a:r>
-              <a:rPr lang="en-US" dirty="0"/>
-              <a:t>and current limiting </a:t>
-            </a:r>
-            <a:r>
-              <a:rPr lang="en-US" dirty="0" smtClean="0"/>
-              <a:t>fuses</a:t>
-            </a:r>
-          </a:p>
-          <a:p>
-            <a:r>
-              <a:rPr lang="en-US" dirty="0" smtClean="0"/>
-              <a:t>“Expulsion </a:t>
-            </a:r>
-            <a:r>
-              <a:rPr lang="en-US" dirty="0"/>
-              <a:t>fuses use gas generation and exhaust to remove conducting particles </a:t>
-            </a:r>
-            <a:r>
-              <a:rPr lang="en-US" dirty="0" smtClean="0"/>
-              <a:t>from the </a:t>
-            </a:r>
-            <a:r>
-              <a:rPr lang="en-US" dirty="0"/>
-              <a:t>arc column and allow the </a:t>
-            </a:r>
-            <a:r>
-              <a:rPr lang="en-US"/>
-              <a:t>fuse </a:t>
-            </a:r>
-            <a:r>
-              <a:rPr lang="en-US" smtClean="0"/>
-              <a:t>to interrupt </a:t>
-            </a:r>
-            <a:r>
-              <a:rPr lang="en-US" dirty="0"/>
-              <a:t>current at current </a:t>
-            </a:r>
-            <a:r>
-              <a:rPr lang="en-US" dirty="0" smtClean="0"/>
-              <a:t>zero”</a:t>
-            </a:r>
-          </a:p>
-          <a:p>
-            <a:r>
-              <a:rPr lang="en-US" dirty="0" smtClean="0"/>
-              <a:t>“Current </a:t>
-            </a:r>
-            <a:r>
-              <a:rPr lang="en-US" dirty="0"/>
-              <a:t>limiting fuses reduce </a:t>
-            </a:r>
-            <a:r>
-              <a:rPr lang="en-US" dirty="0" smtClean="0"/>
-              <a:t>the magnitude </a:t>
-            </a:r>
-            <a:r>
-              <a:rPr lang="en-US" dirty="0"/>
-              <a:t>and duration of the fault current by introducing a high resistance into the </a:t>
-            </a:r>
-            <a:r>
-              <a:rPr lang="en-US" dirty="0" smtClean="0"/>
-              <a:t>circuit”</a:t>
-            </a:r>
-            <a:endParaRPr lang="en-US" dirty="0"/>
-          </a:p>
-        </p:txBody>
-      </p:sp>
-      <p:sp>
-        <p:nvSpPr>
-          <p:cNvPr id="4" name="Content Placeholder 3"/>
-          <p:cNvSpPr>
-            <a:spLocks noGrp="1"/>
-          </p:cNvSpPr>
-          <p:nvPr>
-            <p:ph sz="half" idx="2"/>
-          </p:nvPr>
-        </p:nvSpPr>
-        <p:spPr/>
-        <p:txBody>
-          <a:bodyPr>
-            <a:normAutofit lnSpcReduction="10000"/>
-          </a:bodyPr>
-          <a:lstStyle/>
-          <a:p>
-            <a:endParaRPr lang="en-US" dirty="0"/>
-          </a:p>
-          <a:p>
-            <a:endParaRPr lang="en-US" dirty="0"/>
-          </a:p>
-        </p:txBody>
-      </p:sp>
-      <p:sp>
-        <p:nvSpPr>
-          <p:cNvPr id="5" name="Rectangle 4"/>
-          <p:cNvSpPr/>
-          <p:nvPr/>
-        </p:nvSpPr>
-        <p:spPr>
-          <a:xfrm>
-            <a:off x="609600" y="6106180"/>
-            <a:ext cx="3733800" cy="523220"/>
-          </a:xfrm>
-          <a:prstGeom prst="rect">
-            <a:avLst/>
-          </a:prstGeom>
-        </p:spPr>
-        <p:txBody>
-          <a:bodyPr wrap="square">
-            <a:spAutoFit/>
-          </a:bodyPr>
-          <a:lstStyle/>
-          <a:p>
-            <a:r>
-              <a:rPr lang="en-US" sz="1400" dirty="0" smtClean="0"/>
-              <a:t>IEEE </a:t>
-            </a:r>
-            <a:r>
-              <a:rPr lang="en-US" sz="1400" dirty="0"/>
-              <a:t>Guide for Protective Relay Applications to Distribution Lines</a:t>
-            </a:r>
-            <a:r>
-              <a:rPr lang="en-US" sz="1400" dirty="0" smtClean="0"/>
-              <a:t>, </a:t>
-            </a:r>
-            <a:r>
-              <a:rPr lang="en-US" sz="1400" i="1" dirty="0"/>
-              <a:t>IEEE </a:t>
-            </a:r>
-            <a:r>
-              <a:rPr lang="en-US" sz="1400" i="1" dirty="0" err="1"/>
-              <a:t>Std</a:t>
-            </a:r>
-            <a:r>
-              <a:rPr lang="en-US" sz="1400" i="1" dirty="0"/>
-              <a:t> C37.230-2007</a:t>
-            </a:r>
-            <a:endParaRPr lang="en-US" sz="1400" dirty="0"/>
-          </a:p>
-        </p:txBody>
-      </p:sp>
-      <p:pic>
-        <p:nvPicPr>
-          <p:cNvPr id="11265" name="Picture 1"/>
-          <p:cNvPicPr>
-            <a:picLocks noChangeAspect="1" noChangeArrowheads="1"/>
-          </p:cNvPicPr>
-          <p:nvPr/>
-        </p:nvPicPr>
-        <p:blipFill>
-          <a:blip r:embed="rId2">
-            <a:extLst>
-              <a:ext uri="{28A0092B-C50C-407E-A947-70E740481C1C}">
-                <a14:useLocalDpi xmlns:a14="http://schemas.microsoft.com/office/drawing/2010/main" val="0"/>
-              </a:ext>
-            </a:extLst>
-          </a:blip>
-          <a:srcRect/>
-          <a:stretch>
-            <a:fillRect/>
-          </a:stretch>
-        </p:blipFill>
-        <p:spPr bwMode="auto">
-          <a:xfrm>
-            <a:off x="4343400" y="1219200"/>
-            <a:ext cx="4572000" cy="5168649"/>
-          </a:xfrm>
-          <a:prstGeom prst="rect">
-            <a:avLst/>
-          </a:prstGeom>
-          <a:noFill/>
-          <a:ln>
-            <a:noFill/>
-          </a:ln>
-          <a:effectLst/>
-          <a:extLst>
-            <a:ext uri="{909E8E84-426E-40DD-AFC4-6F175D3DCCD1}">
-              <a14:hiddenFill xmlns:a14="http://schemas.microsoft.com/office/drawing/2010/main">
-                <a:solidFill>
-                  <a:schemeClr val="accent1"/>
-                </a:solidFill>
-              </a14:hiddenFill>
-            </a:ext>
-            <a:ext uri="{91240B29-F687-4F45-9708-019B960494DF}">
-              <a14:hiddenLine xmlns:a14="http://schemas.microsoft.com/office/drawing/2010/main" w="9525">
-                <a:solidFill>
-                  <a:schemeClr val="tx1"/>
-                </a:solidFill>
-                <a:miter lim="800000"/>
-                <a:headEnd/>
-                <a:tailEnd/>
-              </a14:hiddenLine>
-            </a:ext>
-            <a:ext uri="{AF507438-7753-43E0-B8FC-AC1667EBCBE1}">
-              <a14:hiddenEffects xmlns:a14="http://schemas.microsoft.com/office/drawing/2010/main">
-                <a:effectLst>
-                  <a:outerShdw dist="35921" dir="2700000" algn="ctr" rotWithShape="0">
-                    <a:schemeClr val="bg2"/>
-                  </a:outerShdw>
-                </a:effectLst>
-              </a14:hiddenEffects>
-            </a:ext>
-          </a:extLst>
-        </p:spPr>
-      </p:pic>
-    </p:spTree>
-    <p:extLst>
-      <p:ext uri="{BB962C8B-B14F-4D97-AF65-F5344CB8AC3E}">
-        <p14:creationId xmlns:p14="http://schemas.microsoft.com/office/powerpoint/2010/main" val="2361889899"/>
-      </p:ext>
-    </p:extLst>
-  </p:cSld>
-  <p:clrMapOvr>
-    <a:masterClrMapping/>
-  </p:clrMapOvr>
-  <p:timing>
-    <p:tnLst>
-      <p:par>
-        <p:cTn id="1" dur="indefinite" restart="never" nodeType="tmRoot"/>
-      </p:par>
-    </p:tnLst>
-  </p:timing>
-</p:sld>
-</file>
-
-<file path=ppt/slides/slide7.xml><?xml version="1.0" encoding="utf-8"?>
-<p:sld xmlns:a="http://schemas.openxmlformats.org/drawingml/2006/main" xmlns:r="http://schemas.openxmlformats.org/officeDocument/2006/relationships" xmlns:p="http://schemas.openxmlformats.org/presentationml/2006/main">
-  <p:cSld>
-    <p:spTree>
-      <p:nvGrpSpPr>
-        <p:cNvPr id="1" name=""/>
-        <p:cNvGrpSpPr/>
-        <p:nvPr/>
-      </p:nvGrpSpPr>
-      <p:grpSpPr>
-        <a:xfrm>
-          <a:off x="0" y="0"/>
-          <a:ext cx="0" cy="0"/>
-          <a:chOff x="0" y="0"/>
-          <a:chExt cx="0" cy="0"/>
-        </a:xfrm>
-      </p:grpSpPr>
-      <p:sp>
-        <p:nvSpPr>
-          <p:cNvPr id="2" name="Title 1"/>
-          <p:cNvSpPr>
-            <a:spLocks noGrp="1"/>
-          </p:cNvSpPr>
-          <p:nvPr>
-            <p:ph type="title"/>
-          </p:nvPr>
-        </p:nvSpPr>
-        <p:spPr/>
-        <p:txBody>
-          <a:bodyPr/>
-          <a:lstStyle/>
-          <a:p>
-            <a:r>
-              <a:rPr lang="en-US" dirty="0" smtClean="0"/>
-              <a:t>Overcurrent relays</a:t>
-            </a:r>
-            <a:endParaRPr lang="en-US" dirty="0"/>
-          </a:p>
-        </p:txBody>
-      </p:sp>
-      <p:sp>
-        <p:nvSpPr>
-          <p:cNvPr id="3" name="Content Placeholder 2"/>
-          <p:cNvSpPr>
-            <a:spLocks noGrp="1"/>
-          </p:cNvSpPr>
-          <p:nvPr>
-            <p:ph sz="half" idx="1"/>
-          </p:nvPr>
-        </p:nvSpPr>
-        <p:spPr>
-          <a:xfrm>
-            <a:off x="76200" y="1447800"/>
-            <a:ext cx="4038600" cy="4525963"/>
-          </a:xfrm>
-        </p:spPr>
-        <p:txBody>
-          <a:bodyPr>
-            <a:normAutofit/>
-          </a:bodyPr>
-          <a:lstStyle/>
-          <a:p>
-            <a:r>
-              <a:rPr lang="en-US" dirty="0" smtClean="0"/>
-              <a:t>Overcurrent relay and fuses are the oldest</a:t>
-            </a:r>
-            <a:r>
-              <a:rPr lang="en-US" dirty="0"/>
-              <a:t>, least expensive and </a:t>
-            </a:r>
-            <a:r>
-              <a:rPr lang="en-US" dirty="0" smtClean="0"/>
-              <a:t>simplest</a:t>
-            </a:r>
-          </a:p>
-          <a:p>
-            <a:r>
-              <a:rPr lang="en-US" dirty="0" smtClean="0"/>
-              <a:t>Overcurrent relay respond </a:t>
-            </a:r>
-            <a:r>
-              <a:rPr lang="en-US" dirty="0"/>
-              <a:t>to </a:t>
-            </a:r>
-            <a:r>
-              <a:rPr lang="en-US" dirty="0" smtClean="0"/>
-              <a:t>current signals </a:t>
-            </a:r>
-            <a:r>
-              <a:rPr lang="en-US" dirty="0"/>
-              <a:t>from </a:t>
-            </a:r>
-            <a:r>
-              <a:rPr lang="en-US" dirty="0" smtClean="0"/>
-              <a:t>sensors </a:t>
-            </a:r>
-            <a:r>
-              <a:rPr lang="en-US" dirty="0"/>
-              <a:t>and </a:t>
-            </a:r>
-            <a:r>
-              <a:rPr lang="en-US" dirty="0" smtClean="0"/>
-              <a:t>operate circuit breaker</a:t>
-            </a:r>
-          </a:p>
-          <a:p>
-            <a:endParaRPr lang="en-US" dirty="0"/>
-          </a:p>
-        </p:txBody>
-      </p:sp>
-      <p:pic>
-        <p:nvPicPr>
-          <p:cNvPr id="9218" name="Picture 2"/>
-          <p:cNvPicPr>
-            <a:picLocks noChangeAspect="1" noChangeArrowheads="1"/>
-          </p:cNvPicPr>
-          <p:nvPr/>
-        </p:nvPicPr>
-        <p:blipFill>
-          <a:blip r:embed="rId3">
-            <a:extLst>
-              <a:ext uri="{28A0092B-C50C-407E-A947-70E740481C1C}">
-                <a14:useLocalDpi xmlns:a14="http://schemas.microsoft.com/office/drawing/2010/main" val="0"/>
-              </a:ext>
-            </a:extLst>
-          </a:blip>
-          <a:srcRect/>
-          <a:stretch>
-            <a:fillRect/>
-          </a:stretch>
-        </p:blipFill>
-        <p:spPr bwMode="auto">
-          <a:xfrm>
-            <a:off x="4114800" y="1828800"/>
-            <a:ext cx="5074670" cy="3810255"/>
-          </a:xfrm>
-          <a:prstGeom prst="rect">
-            <a:avLst/>
-          </a:prstGeom>
-          <a:noFill/>
-          <a:ln>
-            <a:noFill/>
-          </a:ln>
-          <a:extLst>
-            <a:ext uri="{909E8E84-426E-40DD-AFC4-6F175D3DCCD1}">
-              <a14:hiddenFill xmlns:a14="http://schemas.microsoft.com/office/drawing/2010/main">
-                <a:solidFill>
-                  <a:srgbClr val="FFFFFF"/>
-                </a:solidFill>
-              </a14:hiddenFill>
-            </a:ext>
-            <a:ext uri="{91240B29-F687-4F45-9708-019B960494DF}">
-              <a14:hiddenLine xmlns:a14="http://schemas.microsoft.com/office/drawing/2010/main" w="9525">
-                <a:solidFill>
-                  <a:srgbClr val="000000"/>
-                </a:solidFill>
-                <a:miter lim="800000"/>
-                <a:headEnd/>
-                <a:tailEnd/>
-              </a14:hiddenLine>
-            </a:ext>
-          </a:extLst>
-        </p:spPr>
-      </p:pic>
-      <p:sp>
-        <p:nvSpPr>
-          <p:cNvPr id="5" name="Rectangle 3"/>
-          <p:cNvSpPr>
-            <a:spLocks noChangeArrowheads="1"/>
-          </p:cNvSpPr>
-          <p:nvPr/>
-        </p:nvSpPr>
-        <p:spPr bwMode="auto">
-          <a:xfrm>
-            <a:off x="4114800" y="5520194"/>
-            <a:ext cx="5029200" cy="523220"/>
-          </a:xfrm>
-          <a:prstGeom prst="rect">
-            <a:avLst/>
-          </a:prstGeom>
-          <a:noFill/>
-          <a:ln>
-            <a:noFill/>
-          </a:ln>
-          <a:effectLst/>
-          <a:extLst>
-            <a:ext uri="{909E8E84-426E-40DD-AFC4-6F175D3DCCD1}">
-              <a14:hiddenFill xmlns:a14="http://schemas.microsoft.com/office/drawing/2010/main">
-                <a:solidFill>
-                  <a:schemeClr val="accent1"/>
-                </a:solidFill>
-              </a14:hiddenFill>
-            </a:ext>
-            <a:ext uri="{91240B29-F687-4F45-9708-019B960494DF}">
-              <a14:hiddenLine xmlns:a14="http://schemas.microsoft.com/office/drawing/2010/main" w="9525">
-                <a:solidFill>
-                  <a:schemeClr val="tx1"/>
-                </a:solidFill>
-                <a:miter lim="800000"/>
-                <a:headEnd/>
-                <a:tailEnd/>
-              </a14:hiddenLine>
-            </a:ext>
-            <a:ext uri="{AF507438-7753-43E0-B8FC-AC1667EBCBE1}">
-              <a14:hiddenEffects xmlns:a14="http://schemas.microsoft.com/office/drawing/2010/main">
-                <a:effectLst>
-                  <a:outerShdw dist="35921" dir="2700000" algn="ctr" rotWithShape="0">
-                    <a:schemeClr val="bg2"/>
-                  </a:outerShdw>
-                </a:effectLst>
-              </a14:hiddenEffects>
-            </a:ext>
-          </a:extLst>
-        </p:spPr>
-        <p:txBody>
-          <a:bodyPr vert="horz" wrap="square" lIns="91440" tIns="45720" rIns="91440" bIns="45720" numCol="1" anchor="ctr" anchorCtr="0" compatLnSpc="1">
-            <a:prstTxWarp prst="textNoShape">
-              <a:avLst/>
-            </a:prstTxWarp>
-            <a:spAutoFit/>
-          </a:bodyPr>
-          <a:lstStyle/>
-          <a:p>
-            <a:pPr marL="0" marR="0" lvl="0" indent="0" algn="just" defTabSz="914400" rtl="0" eaLnBrk="1" fontAlgn="base" latinLnBrk="0" hangingPunct="1">
-              <a:lnSpc>
-                <a:spcPct val="100000"/>
-              </a:lnSpc>
-              <a:spcBef>
-                <a:spcPct val="0"/>
-              </a:spcBef>
-              <a:spcAft>
-                <a:spcPct val="0"/>
-              </a:spcAft>
-              <a:buClrTx/>
-              <a:buSzTx/>
-              <a:buFontTx/>
-              <a:buNone/>
-              <a:tabLst/>
-            </a:pPr>
-            <a:r>
-              <a:rPr kumimoji="0" lang="en-US" sz="1400" b="0" i="0" u="none" strike="noStrike" cap="none" normalizeH="0" baseline="0" dirty="0" smtClean="0">
-                <a:ln>
-                  <a:noFill/>
-                </a:ln>
-                <a:solidFill>
-                  <a:schemeClr val="tx1"/>
-                </a:solidFill>
-                <a:effectLst/>
-                <a:latin typeface="Arial" pitchFamily="34" charset="0"/>
-                <a:ea typeface="Times New Roman" pitchFamily="18" charset="0"/>
-              </a:rPr>
-              <a:t>Inverse time-current characteristic of relay according to IEEE standard</a:t>
-            </a:r>
-            <a:r>
-              <a:rPr kumimoji="0" lang="en-US" sz="1400" b="0" i="0" u="none" strike="noStrike" cap="none" normalizeH="0" baseline="30000" dirty="0" smtClean="0">
-                <a:ln>
-                  <a:noFill/>
-                </a:ln>
-                <a:solidFill>
-                  <a:schemeClr val="tx1"/>
-                </a:solidFill>
-                <a:effectLst/>
-                <a:latin typeface="Arial" pitchFamily="34" charset="0"/>
-                <a:ea typeface="Times New Roman" pitchFamily="18" charset="0"/>
-              </a:rPr>
-              <a:t>1 </a:t>
-            </a:r>
-            <a:r>
-              <a:rPr kumimoji="0" lang="en-US" sz="1400" b="0" i="0" u="none" strike="noStrike" cap="none" normalizeH="0" baseline="0" dirty="0" smtClean="0">
-                <a:ln>
-                  <a:noFill/>
-                </a:ln>
-                <a:solidFill>
-                  <a:schemeClr val="tx1"/>
-                </a:solidFill>
-                <a:effectLst/>
-                <a:latin typeface="Arial" pitchFamily="34" charset="0"/>
-                <a:ea typeface="Times New Roman" pitchFamily="18" charset="0"/>
-              </a:rPr>
-              <a:t>and power line used for real-time thermal rating</a:t>
-            </a:r>
-            <a:r>
-              <a:rPr kumimoji="0" lang="en-US" sz="1400" b="0" i="0" u="none" strike="noStrike" cap="none" normalizeH="0" baseline="30000" dirty="0" smtClean="0">
-                <a:ln>
-                  <a:noFill/>
-                </a:ln>
-                <a:solidFill>
-                  <a:schemeClr val="tx1"/>
-                </a:solidFill>
-                <a:effectLst/>
-                <a:latin typeface="Arial" pitchFamily="34" charset="0"/>
-                <a:ea typeface="Times New Roman" pitchFamily="18" charset="0"/>
-              </a:rPr>
-              <a:t>2</a:t>
-            </a:r>
-            <a:endParaRPr kumimoji="0" lang="en-US" sz="4000" b="0" i="0" u="none" strike="noStrike" cap="none" normalizeH="0" baseline="0" dirty="0" smtClean="0">
-              <a:ln>
-                <a:noFill/>
-              </a:ln>
-              <a:solidFill>
-                <a:schemeClr val="tx1"/>
-              </a:solidFill>
-              <a:effectLst/>
-              <a:latin typeface="Arial" pitchFamily="34" charset="0"/>
-            </a:endParaRPr>
-          </a:p>
-        </p:txBody>
-      </p:sp>
-      <p:sp>
-        <p:nvSpPr>
-          <p:cNvPr id="8" name="Rectangle 7"/>
-          <p:cNvSpPr/>
-          <p:nvPr/>
-        </p:nvSpPr>
-        <p:spPr>
-          <a:xfrm>
-            <a:off x="457200" y="6135469"/>
-            <a:ext cx="8305800" cy="830997"/>
-          </a:xfrm>
-          <a:prstGeom prst="rect">
-            <a:avLst/>
-          </a:prstGeom>
-        </p:spPr>
-        <p:txBody>
-          <a:bodyPr wrap="square">
-            <a:spAutoFit/>
-          </a:bodyPr>
-          <a:lstStyle/>
-          <a:p>
-            <a:pPr lvl="0"/>
-            <a:r>
-              <a:rPr lang="en-US" sz="1200" dirty="0"/>
-              <a:t>1</a:t>
-            </a:r>
-            <a:r>
-              <a:rPr lang="en-US" sz="1200" dirty="0" smtClean="0"/>
-              <a:t>: "IEEE </a:t>
-            </a:r>
-            <a:r>
-              <a:rPr lang="en-US" sz="1200" dirty="0"/>
-              <a:t>standard inverse-time characteristic equations for overcurrent relays," IEEE </a:t>
-            </a:r>
-            <a:r>
-              <a:rPr lang="en-US" sz="1200" dirty="0" smtClean="0"/>
-              <a:t>Trans. </a:t>
-            </a:r>
-            <a:r>
-              <a:rPr lang="en-US" sz="1200" dirty="0"/>
-              <a:t>on Power Delivery, </a:t>
-            </a:r>
-            <a:r>
-              <a:rPr lang="en-US" sz="1200" dirty="0" smtClean="0"/>
-              <a:t>Jul </a:t>
-            </a:r>
-            <a:r>
-              <a:rPr lang="en-US" sz="1200" dirty="0"/>
-              <a:t>1999</a:t>
-            </a:r>
-            <a:r>
-              <a:rPr lang="en-US" sz="1200" dirty="0" smtClean="0"/>
-              <a:t>.</a:t>
-            </a:r>
-          </a:p>
-          <a:p>
-            <a:r>
-              <a:rPr lang="en-US" sz="1200" dirty="0" smtClean="0"/>
-              <a:t>2: </a:t>
-            </a:r>
-            <a:r>
-              <a:rPr lang="en-US" sz="1200" dirty="0"/>
-              <a:t>M.W. Davis, "A new thermal rating approach: The real time thermal rating system for strategic overhead conductor transmission lines - Part I," IEEE Trans. on Power Apparatus and Systems, May 1977</a:t>
-            </a:r>
-          </a:p>
-          <a:p>
-            <a:pPr lvl="0"/>
-            <a:endParaRPr lang="en-US" sz="1200" dirty="0"/>
-          </a:p>
-        </p:txBody>
-      </p:sp>
-      <p:sp>
-        <p:nvSpPr>
-          <p:cNvPr id="9" name="Rectangle 5"/>
-          <p:cNvSpPr>
-            <a:spLocks noChangeArrowheads="1"/>
-          </p:cNvSpPr>
-          <p:nvPr/>
-        </p:nvSpPr>
-        <p:spPr bwMode="auto">
-          <a:xfrm>
-            <a:off x="0" y="0"/>
-            <a:ext cx="9144000" cy="0"/>
-          </a:xfrm>
-          <a:prstGeom prst="rect">
-            <a:avLst/>
-          </a:prstGeom>
-          <a:noFill/>
-          <a:ln>
-            <a:noFill/>
-          </a:ln>
-          <a:effectLst/>
-          <a:extLst>
-            <a:ext uri="{909E8E84-426E-40DD-AFC4-6F175D3DCCD1}">
-              <a14:hiddenFill xmlns:a14="http://schemas.microsoft.com/office/drawing/2010/main">
-                <a:solidFill>
-                  <a:schemeClr val="accent1"/>
-                </a:solidFill>
-              </a14:hiddenFill>
-            </a:ext>
-            <a:ext uri="{91240B29-F687-4F45-9708-019B960494DF}">
-              <a14:hiddenLine xmlns:a14="http://schemas.microsoft.com/office/drawing/2010/main" w="9525">
-                <a:solidFill>
-                  <a:schemeClr val="tx1"/>
-                </a:solidFill>
-                <a:miter lim="800000"/>
-                <a:headEnd/>
-                <a:tailEnd/>
-              </a14:hiddenLine>
-            </a:ext>
-            <a:ext uri="{AF507438-7753-43E0-B8FC-AC1667EBCBE1}">
-              <a14:hiddenEffects xmlns:a14="http://schemas.microsoft.com/office/drawing/2010/main">
-                <a:effectLst>
-                  <a:outerShdw dist="35921" dir="2700000" algn="ctr" rotWithShape="0">
-                    <a:schemeClr val="bg2"/>
-                  </a:outerShdw>
-                </a:effectLst>
-              </a14:hiddenEffects>
-            </a:ext>
-          </a:extLst>
-        </p:spPr>
-        <p:txBody>
-          <a:bodyPr vert="horz" wrap="none" lIns="91440" tIns="45720" rIns="91440" bIns="45720" numCol="1" anchor="ctr" anchorCtr="0" compatLnSpc="1">
-            <a:prstTxWarp prst="textNoShape">
-              <a:avLst/>
-            </a:prstTxWarp>
-            <a:spAutoFit/>
-          </a:bodyPr>
-          <a:lstStyle/>
-          <a:p>
-            <a:endParaRPr lang="en-US"/>
-          </a:p>
-        </p:txBody>
-      </p:sp>
-      <p:graphicFrame>
-        <p:nvGraphicFramePr>
-          <p:cNvPr id="10" name="Object 9"/>
-          <p:cNvGraphicFramePr>
-            <a:graphicFrameLocks noChangeAspect="1"/>
-          </p:cNvGraphicFramePr>
-          <p:nvPr>
-            <p:extLst>
-              <p:ext uri="{D42A27DB-BD31-4B8C-83A1-F6EECF244321}">
-                <p14:modId xmlns:p14="http://schemas.microsoft.com/office/powerpoint/2010/main" val="1946351968"/>
-              </p:ext>
-            </p:extLst>
-          </p:nvPr>
-        </p:nvGraphicFramePr>
-        <p:xfrm>
-          <a:off x="990600" y="3886200"/>
-          <a:ext cx="2113577" cy="609600"/>
-        </p:xfrm>
-        <a:graphic>
-          <a:graphicData uri="http://schemas.openxmlformats.org/presentationml/2006/ole">
-            <mc:AlternateContent xmlns:mc="http://schemas.openxmlformats.org/markup-compatibility/2006">
-              <mc:Choice xmlns:v="urn:schemas-microsoft-com:vml" Requires="v">
-                <p:oleObj spid="_x0000_s9237" name="Equation" r:id="rId4" imgW="1511300" imgH="431800" progId="Equation.DSMT4">
-                  <p:embed/>
-                </p:oleObj>
-              </mc:Choice>
-              <mc:Fallback>
-                <p:oleObj name="Equation" r:id="rId4" imgW="1511300" imgH="431800" progId="Equation.DSMT4">
-                  <p:embed/>
-                  <p:pic>
-                    <p:nvPicPr>
-                      <p:cNvPr id="0" name="Object 4"/>
-                      <p:cNvPicPr>
-                        <a:picLocks noChangeAspect="1" noChangeArrowheads="1"/>
-                      </p:cNvPicPr>
-                      <p:nvPr/>
-                    </p:nvPicPr>
-                    <p:blipFill>
-                      <a:blip r:embed="rId5">
-                        <a:extLst>
-                          <a:ext uri="{28A0092B-C50C-407E-A947-70E740481C1C}">
-                            <a14:useLocalDpi xmlns:a14="http://schemas.microsoft.com/office/drawing/2010/main" val="0"/>
-                          </a:ext>
-                        </a:extLst>
-                      </a:blip>
-                      <a:srcRect/>
-                      <a:stretch>
-                        <a:fillRect/>
-                      </a:stretch>
-                    </p:blipFill>
-                    <p:spPr bwMode="auto">
-                      <a:xfrm>
-                        <a:off x="990600" y="3886200"/>
-                        <a:ext cx="2113577" cy="609600"/>
-                      </a:xfrm>
-                      <a:prstGeom prst="rect">
-                        <a:avLst/>
-                      </a:prstGeom>
-                      <a:noFill/>
-                    </p:spPr>
-                  </p:pic>
-                </p:oleObj>
-              </mc:Fallback>
-            </mc:AlternateContent>
-          </a:graphicData>
-        </a:graphic>
-      </p:graphicFrame>
-      <p:pic>
-        <p:nvPicPr>
-          <p:cNvPr id="12" name="Picture 6"/>
-          <p:cNvPicPr>
-            <a:picLocks noChangeAspect="1" noChangeArrowheads="1"/>
-          </p:cNvPicPr>
-          <p:nvPr/>
-        </p:nvPicPr>
-        <p:blipFill>
-          <a:blip r:embed="rId6" cstate="print"/>
-          <a:srcRect/>
-          <a:stretch>
-            <a:fillRect/>
-          </a:stretch>
-        </p:blipFill>
-        <p:spPr bwMode="auto">
-          <a:xfrm>
-            <a:off x="381000" y="4674063"/>
-            <a:ext cx="3581400" cy="1115518"/>
-          </a:xfrm>
-          <a:prstGeom prst="rect">
-            <a:avLst/>
-          </a:prstGeom>
-          <a:noFill/>
-          <a:ln w="9525">
-            <a:noFill/>
-            <a:miter lim="800000"/>
-            <a:headEnd/>
-            <a:tailEnd/>
-          </a:ln>
-        </p:spPr>
-      </p:pic>
-      <p:sp>
-        <p:nvSpPr>
-          <p:cNvPr id="11" name="TextBox 10"/>
-          <p:cNvSpPr txBox="1"/>
-          <p:nvPr/>
-        </p:nvSpPr>
-        <p:spPr>
-          <a:xfrm>
-            <a:off x="1471796" y="5788223"/>
-            <a:ext cx="1508811" cy="307777"/>
-          </a:xfrm>
-          <a:prstGeom prst="rect">
-            <a:avLst/>
-          </a:prstGeom>
-          <a:noFill/>
-        </p:spPr>
-        <p:txBody>
-          <a:bodyPr wrap="none" rtlCol="0">
-            <a:spAutoFit/>
-          </a:bodyPr>
-          <a:lstStyle/>
-          <a:p>
-            <a:r>
-              <a:rPr lang="en-US" sz="1400" dirty="0" smtClean="0"/>
-              <a:t>(Extracted from </a:t>
-            </a:r>
-            <a:r>
-              <a:rPr lang="en-US" sz="1400" baseline="30000" dirty="0" smtClean="0"/>
-              <a:t>1</a:t>
-            </a:r>
-            <a:r>
-              <a:rPr lang="en-US" sz="1400" dirty="0" smtClean="0"/>
-              <a:t>)</a:t>
-            </a:r>
-            <a:endParaRPr lang="en-US" dirty="0"/>
-          </a:p>
-        </p:txBody>
-      </p:sp>
-    </p:spTree>
-    <p:extLst>
-      <p:ext uri="{BB962C8B-B14F-4D97-AF65-F5344CB8AC3E}">
-        <p14:creationId xmlns:p14="http://schemas.microsoft.com/office/powerpoint/2010/main" val="1472949330"/>
-      </p:ext>
-    </p:extLst>
-  </p:cSld>
-  <p:clrMapOvr>
-    <a:masterClrMapping/>
-  </p:clrMapOvr>
-  <p:timing>
-    <p:tnLst>
-      <p:par>
-        <p:cTn id="1" dur="indefinite" restart="never" nodeType="tmRoot"/>
-      </p:par>
-    </p:tnLst>
-  </p:timing>
-</p:sld>
-</file>
-
-<file path=ppt/slides/slide8.xml><?xml version="1.0" encoding="utf-8"?>
-<p:sld xmlns:a="http://schemas.openxmlformats.org/drawingml/2006/main" xmlns:r="http://schemas.openxmlformats.org/officeDocument/2006/relationships" xmlns:p="http://schemas.openxmlformats.org/presentationml/2006/main">
-  <p:cSld>
-    <p:spTree>
-      <p:nvGrpSpPr>
-        <p:cNvPr id="1" name=""/>
-        <p:cNvGrpSpPr/>
-        <p:nvPr/>
-      </p:nvGrpSpPr>
-      <p:grpSpPr>
-        <a:xfrm>
-          <a:off x="0" y="0"/>
-          <a:ext cx="0" cy="0"/>
-          <a:chOff x="0" y="0"/>
-          <a:chExt cx="0" cy="0"/>
-        </a:xfrm>
-      </p:grpSpPr>
-      <p:sp>
-        <p:nvSpPr>
-          <p:cNvPr id="2" name="Title 1"/>
-          <p:cNvSpPr>
-            <a:spLocks noGrp="1"/>
-          </p:cNvSpPr>
-          <p:nvPr>
-            <p:ph type="title"/>
-          </p:nvPr>
-        </p:nvSpPr>
-        <p:spPr/>
-        <p:txBody>
-          <a:bodyPr/>
-          <a:lstStyle/>
-          <a:p>
-            <a:r>
-              <a:rPr lang="en-US" dirty="0" smtClean="0"/>
-              <a:t>Switches</a:t>
-            </a:r>
-            <a:endParaRPr lang="en-US" dirty="0"/>
-          </a:p>
-        </p:txBody>
-      </p:sp>
-      <p:sp>
-        <p:nvSpPr>
-          <p:cNvPr id="3" name="Content Placeholder 2"/>
-          <p:cNvSpPr>
-            <a:spLocks noGrp="1"/>
-          </p:cNvSpPr>
-          <p:nvPr>
-            <p:ph idx="1"/>
-          </p:nvPr>
-        </p:nvSpPr>
-        <p:spPr>
-          <a:xfrm>
-            <a:off x="533400" y="1600200"/>
-            <a:ext cx="3886200" cy="1676400"/>
-          </a:xfrm>
-        </p:spPr>
-        <p:txBody>
-          <a:bodyPr/>
-          <a:lstStyle/>
-          <a:p>
-            <a:r>
-              <a:rPr lang="en-US" dirty="0"/>
-              <a:t>Switches are simple devices that typically do not have any controls or communication</a:t>
-            </a:r>
-            <a:r>
-              <a:rPr lang="en-US" dirty="0" smtClean="0"/>
-              <a:t>.</a:t>
-            </a:r>
-            <a:endParaRPr lang="en-US" dirty="0"/>
-          </a:p>
-        </p:txBody>
-      </p:sp>
-      <p:sp>
-        <p:nvSpPr>
-          <p:cNvPr id="4" name="Slide Number Placeholder 3"/>
-          <p:cNvSpPr>
-            <a:spLocks noGrp="1"/>
-          </p:cNvSpPr>
-          <p:nvPr>
-            <p:ph type="sldNum" sz="quarter" idx="12"/>
-          </p:nvPr>
-        </p:nvSpPr>
-        <p:spPr/>
-        <p:txBody>
-          <a:bodyPr/>
-          <a:lstStyle/>
-          <a:p>
-            <a:fld id="{B6F15528-21DE-4FAA-801E-634DDDAF4B2B}" type="slidenum">
-              <a:rPr lang="en-US" smtClean="0">
-                <a:solidFill>
-                  <a:prstClr val="black">
-                    <a:tint val="75000"/>
-                  </a:prstClr>
-                </a:solidFill>
-              </a:rPr>
-              <a:pPr/>
-              <a:t>8</a:t>
             </a:fld>
             <a:endParaRPr lang="en-US" dirty="0">
               <a:solidFill>
@@ -12192,7 +11648,7 @@
 </p:sld>
 </file>
 
-<file path=ppt/slides/slide9.xml><?xml version="1.0" encoding="utf-8"?>
+<file path=ppt/slides/slide6.xml><?xml version="1.0" encoding="utf-8"?>
 <p:sld xmlns:a="http://schemas.openxmlformats.org/drawingml/2006/main" xmlns:r="http://schemas.openxmlformats.org/officeDocument/2006/relationships" xmlns:p="http://schemas.openxmlformats.org/presentationml/2006/main">
   <p:cSld>
     <p:spTree>
@@ -12404,6 +11860,593 @@
     <p:extLst>
       <p:ext uri="{BB962C8B-B14F-4D97-AF65-F5344CB8AC3E}">
         <p14:creationId xmlns:p14="http://schemas.microsoft.com/office/powerpoint/2010/main" val="2015142582"/>
+      </p:ext>
+    </p:extLst>
+  </p:cSld>
+  <p:clrMapOvr>
+    <a:masterClrMapping/>
+  </p:clrMapOvr>
+  <p:timing>
+    <p:tnLst>
+      <p:par>
+        <p:cTn id="1" dur="indefinite" restart="never" nodeType="tmRoot"/>
+      </p:par>
+    </p:tnLst>
+  </p:timing>
+</p:sld>
+</file>
+
+<file path=ppt/slides/slide7.xml><?xml version="1.0" encoding="utf-8"?>
+<p:sld xmlns:a="http://schemas.openxmlformats.org/drawingml/2006/main" xmlns:r="http://schemas.openxmlformats.org/officeDocument/2006/relationships" xmlns:p="http://schemas.openxmlformats.org/presentationml/2006/main">
+  <p:cSld>
+    <p:spTree>
+      <p:nvGrpSpPr>
+        <p:cNvPr id="1" name=""/>
+        <p:cNvGrpSpPr/>
+        <p:nvPr/>
+      </p:nvGrpSpPr>
+      <p:grpSpPr>
+        <a:xfrm>
+          <a:off x="0" y="0"/>
+          <a:ext cx="0" cy="0"/>
+          <a:chOff x="0" y="0"/>
+          <a:chExt cx="0" cy="0"/>
+        </a:xfrm>
+      </p:grpSpPr>
+      <p:sp>
+        <p:nvSpPr>
+          <p:cNvPr id="2" name="Title 1"/>
+          <p:cNvSpPr>
+            <a:spLocks noGrp="1"/>
+          </p:cNvSpPr>
+          <p:nvPr>
+            <p:ph type="title"/>
+          </p:nvPr>
+        </p:nvSpPr>
+        <p:spPr/>
+        <p:txBody>
+          <a:bodyPr/>
+          <a:lstStyle/>
+          <a:p>
+            <a:r>
+              <a:rPr lang="en-US" dirty="0" smtClean="0"/>
+              <a:t>Circuit Breakers</a:t>
+            </a:r>
+            <a:endParaRPr lang="en-US" dirty="0"/>
+          </a:p>
+        </p:txBody>
+      </p:sp>
+      <p:sp>
+        <p:nvSpPr>
+          <p:cNvPr id="3" name="Content Placeholder 2"/>
+          <p:cNvSpPr>
+            <a:spLocks noGrp="1"/>
+          </p:cNvSpPr>
+          <p:nvPr>
+            <p:ph idx="1"/>
+          </p:nvPr>
+        </p:nvSpPr>
+        <p:spPr>
+          <a:xfrm>
+            <a:off x="457200" y="1371600"/>
+            <a:ext cx="8229600" cy="4525963"/>
+          </a:xfrm>
+        </p:spPr>
+        <p:txBody>
+          <a:bodyPr/>
+          <a:lstStyle/>
+          <a:p>
+            <a:r>
+              <a:rPr lang="en-US" dirty="0" smtClean="0"/>
+              <a:t>Similar </a:t>
+            </a:r>
+            <a:r>
+              <a:rPr lang="en-US" dirty="0"/>
+              <a:t>to switches, but have the ability to break fault current and work autonomously.</a:t>
+            </a:r>
+          </a:p>
+          <a:p>
+            <a:r>
+              <a:rPr lang="en-US" dirty="0"/>
+              <a:t>Do not need to be replaced like fuses and can generally be reset/closed.</a:t>
+            </a:r>
+          </a:p>
+          <a:p>
+            <a:r>
+              <a:rPr lang="en-US" dirty="0"/>
+              <a:t>Typically used for protection rather than a simple disconnect.</a:t>
+            </a:r>
+          </a:p>
+          <a:p>
+            <a:r>
+              <a:rPr lang="en-US" dirty="0"/>
+              <a:t>Older models don’t have communications or complex controls</a:t>
+            </a:r>
+            <a:r>
+              <a:rPr lang="en-US" dirty="0" smtClean="0"/>
+              <a:t>.</a:t>
+            </a:r>
+            <a:endParaRPr lang="en-US" dirty="0"/>
+          </a:p>
+        </p:txBody>
+      </p:sp>
+      <p:sp>
+        <p:nvSpPr>
+          <p:cNvPr id="4" name="Slide Number Placeholder 3"/>
+          <p:cNvSpPr>
+            <a:spLocks noGrp="1"/>
+          </p:cNvSpPr>
+          <p:nvPr>
+            <p:ph type="sldNum" sz="quarter" idx="12"/>
+          </p:nvPr>
+        </p:nvSpPr>
+        <p:spPr/>
+        <p:txBody>
+          <a:bodyPr/>
+          <a:lstStyle/>
+          <a:p>
+            <a:fld id="{B6F15528-21DE-4FAA-801E-634DDDAF4B2B}" type="slidenum">
+              <a:rPr lang="en-US" smtClean="0">
+                <a:solidFill>
+                  <a:prstClr val="black">
+                    <a:tint val="75000"/>
+                  </a:prstClr>
+                </a:solidFill>
+              </a:rPr>
+              <a:pPr/>
+              <a:t>7</a:t>
+            </a:fld>
+            <a:endParaRPr lang="en-US" dirty="0">
+              <a:solidFill>
+                <a:prstClr val="black">
+                  <a:tint val="75000"/>
+                </a:prstClr>
+              </a:solidFill>
+            </a:endParaRPr>
+          </a:p>
+        </p:txBody>
+      </p:sp>
+      <p:pic>
+        <p:nvPicPr>
+          <p:cNvPr id="5" name="Picture 4"/>
+          <p:cNvPicPr>
+            <a:picLocks noChangeAspect="1"/>
+          </p:cNvPicPr>
+          <p:nvPr/>
+        </p:nvPicPr>
+        <p:blipFill>
+          <a:blip r:embed="rId2" cstate="print">
+            <a:extLst>
+              <a:ext uri="{28A0092B-C50C-407E-A947-70E740481C1C}">
+                <a14:useLocalDpi xmlns:a14="http://schemas.microsoft.com/office/drawing/2010/main" val="0"/>
+              </a:ext>
+            </a:extLst>
+          </a:blip>
+          <a:stretch>
+            <a:fillRect/>
+          </a:stretch>
+        </p:blipFill>
+        <p:spPr>
+          <a:xfrm>
+            <a:off x="914400" y="4210050"/>
+            <a:ext cx="3124200" cy="2343150"/>
+          </a:xfrm>
+          <a:prstGeom prst="rect">
+            <a:avLst/>
+          </a:prstGeom>
+          <a:ln>
+            <a:noFill/>
+          </a:ln>
+          <a:effectLst>
+            <a:outerShdw blurRad="190500" algn="tl" rotWithShape="0">
+              <a:srgbClr val="000000">
+                <a:alpha val="70000"/>
+              </a:srgbClr>
+            </a:outerShdw>
+          </a:effectLst>
+        </p:spPr>
+      </p:pic>
+      <p:pic>
+        <p:nvPicPr>
+          <p:cNvPr id="6" name="Picture 5"/>
+          <p:cNvPicPr>
+            <a:picLocks noChangeAspect="1"/>
+          </p:cNvPicPr>
+          <p:nvPr/>
+        </p:nvPicPr>
+        <p:blipFill>
+          <a:blip r:embed="rId3" cstate="print">
+            <a:extLst>
+              <a:ext uri="{28A0092B-C50C-407E-A947-70E740481C1C}">
+                <a14:useLocalDpi xmlns:a14="http://schemas.microsoft.com/office/drawing/2010/main" val="0"/>
+              </a:ext>
+            </a:extLst>
+          </a:blip>
+          <a:stretch>
+            <a:fillRect/>
+          </a:stretch>
+        </p:blipFill>
+        <p:spPr>
+          <a:xfrm>
+            <a:off x="4953000" y="4181475"/>
+            <a:ext cx="3200400" cy="2400300"/>
+          </a:xfrm>
+          <a:prstGeom prst="rect">
+            <a:avLst/>
+          </a:prstGeom>
+          <a:ln>
+            <a:noFill/>
+          </a:ln>
+          <a:effectLst>
+            <a:outerShdw blurRad="190500" algn="tl" rotWithShape="0">
+              <a:srgbClr val="000000">
+                <a:alpha val="70000"/>
+              </a:srgbClr>
+            </a:outerShdw>
+          </a:effectLst>
+        </p:spPr>
+      </p:pic>
+    </p:spTree>
+    <p:extLst>
+      <p:ext uri="{BB962C8B-B14F-4D97-AF65-F5344CB8AC3E}">
+        <p14:creationId xmlns:p14="http://schemas.microsoft.com/office/powerpoint/2010/main" val="3350047888"/>
+      </p:ext>
+    </p:extLst>
+  </p:cSld>
+  <p:clrMapOvr>
+    <a:masterClrMapping/>
+  </p:clrMapOvr>
+  <p:timing>
+    <p:tnLst>
+      <p:par>
+        <p:cTn id="1" dur="indefinite" restart="never" nodeType="tmRoot"/>
+      </p:par>
+    </p:tnLst>
+  </p:timing>
+</p:sld>
+</file>
+
+<file path=ppt/slides/slide8.xml><?xml version="1.0" encoding="utf-8"?>
+<p:sld xmlns:a="http://schemas.openxmlformats.org/drawingml/2006/main" xmlns:r="http://schemas.openxmlformats.org/officeDocument/2006/relationships" xmlns:p="http://schemas.openxmlformats.org/presentationml/2006/main">
+  <p:cSld>
+    <p:spTree>
+      <p:nvGrpSpPr>
+        <p:cNvPr id="1" name=""/>
+        <p:cNvGrpSpPr/>
+        <p:nvPr/>
+      </p:nvGrpSpPr>
+      <p:grpSpPr>
+        <a:xfrm>
+          <a:off x="0" y="0"/>
+          <a:ext cx="0" cy="0"/>
+          <a:chOff x="0" y="0"/>
+          <a:chExt cx="0" cy="0"/>
+        </a:xfrm>
+      </p:grpSpPr>
+      <p:sp>
+        <p:nvSpPr>
+          <p:cNvPr id="2" name="Title 1"/>
+          <p:cNvSpPr>
+            <a:spLocks noGrp="1"/>
+          </p:cNvSpPr>
+          <p:nvPr>
+            <p:ph type="title"/>
+          </p:nvPr>
+        </p:nvSpPr>
+        <p:spPr/>
+        <p:txBody>
+          <a:bodyPr/>
+          <a:lstStyle/>
+          <a:p>
+            <a:r>
+              <a:rPr lang="en-US" dirty="0" smtClean="0"/>
+              <a:t>Circuit Breakers</a:t>
+            </a:r>
+            <a:endParaRPr lang="en-US" dirty="0"/>
+          </a:p>
+        </p:txBody>
+      </p:sp>
+      <p:sp>
+        <p:nvSpPr>
+          <p:cNvPr id="3" name="Content Placeholder 2"/>
+          <p:cNvSpPr>
+            <a:spLocks noGrp="1"/>
+          </p:cNvSpPr>
+          <p:nvPr>
+            <p:ph idx="1"/>
+          </p:nvPr>
+        </p:nvSpPr>
+        <p:spPr/>
+        <p:txBody>
+          <a:bodyPr/>
+          <a:lstStyle/>
+          <a:p>
+            <a:r>
+              <a:rPr lang="en-US" dirty="0"/>
+              <a:t>Newer models have the option to have communications and more complex controls.</a:t>
+            </a:r>
+          </a:p>
+          <a:p>
+            <a:r>
+              <a:rPr lang="en-US" dirty="0"/>
+              <a:t>Given the ability to control remotely and provide feedback to the control center, circuit breakers are becoming more prevalent for feeder reconfiguration and </a:t>
+            </a:r>
+            <a:r>
+              <a:rPr lang="en-US" dirty="0" smtClean="0"/>
+              <a:t>as bypass components.</a:t>
+            </a:r>
+            <a:endParaRPr lang="en-US" dirty="0"/>
+          </a:p>
+          <a:p>
+            <a:endParaRPr lang="en-US" dirty="0"/>
+          </a:p>
+          <a:p>
+            <a:endParaRPr lang="en-US" dirty="0"/>
+          </a:p>
+        </p:txBody>
+      </p:sp>
+      <p:sp>
+        <p:nvSpPr>
+          <p:cNvPr id="4" name="Slide Number Placeholder 3"/>
+          <p:cNvSpPr>
+            <a:spLocks noGrp="1"/>
+          </p:cNvSpPr>
+          <p:nvPr>
+            <p:ph type="sldNum" sz="quarter" idx="12"/>
+          </p:nvPr>
+        </p:nvSpPr>
+        <p:spPr/>
+        <p:txBody>
+          <a:bodyPr/>
+          <a:lstStyle/>
+          <a:p>
+            <a:fld id="{B6F15528-21DE-4FAA-801E-634DDDAF4B2B}" type="slidenum">
+              <a:rPr lang="en-US" smtClean="0">
+                <a:solidFill>
+                  <a:prstClr val="black">
+                    <a:tint val="75000"/>
+                  </a:prstClr>
+                </a:solidFill>
+              </a:rPr>
+              <a:pPr/>
+              <a:t>8</a:t>
+            </a:fld>
+            <a:endParaRPr lang="en-US" dirty="0">
+              <a:solidFill>
+                <a:prstClr val="black">
+                  <a:tint val="75000"/>
+                </a:prstClr>
+              </a:solidFill>
+            </a:endParaRPr>
+          </a:p>
+        </p:txBody>
+      </p:sp>
+    </p:spTree>
+    <p:extLst>
+      <p:ext uri="{BB962C8B-B14F-4D97-AF65-F5344CB8AC3E}">
+        <p14:creationId xmlns:p14="http://schemas.microsoft.com/office/powerpoint/2010/main" val="3130473962"/>
+      </p:ext>
+    </p:extLst>
+  </p:cSld>
+  <p:clrMapOvr>
+    <a:masterClrMapping/>
+  </p:clrMapOvr>
+  <p:timing>
+    <p:tnLst>
+      <p:par>
+        <p:cTn id="1" dur="indefinite" restart="never" nodeType="tmRoot"/>
+      </p:par>
+    </p:tnLst>
+  </p:timing>
+</p:sld>
+</file>
+
+<file path=ppt/slides/slide9.xml><?xml version="1.0" encoding="utf-8"?>
+<p:sld xmlns:a="http://schemas.openxmlformats.org/drawingml/2006/main" xmlns:r="http://schemas.openxmlformats.org/officeDocument/2006/relationships" xmlns:p="http://schemas.openxmlformats.org/presentationml/2006/main">
+  <p:cSld>
+    <p:spTree>
+      <p:nvGrpSpPr>
+        <p:cNvPr id="1" name=""/>
+        <p:cNvGrpSpPr/>
+        <p:nvPr/>
+      </p:nvGrpSpPr>
+      <p:grpSpPr>
+        <a:xfrm>
+          <a:off x="0" y="0"/>
+          <a:ext cx="0" cy="0"/>
+          <a:chOff x="0" y="0"/>
+          <a:chExt cx="0" cy="0"/>
+        </a:xfrm>
+      </p:grpSpPr>
+      <p:sp>
+        <p:nvSpPr>
+          <p:cNvPr id="2" name="Title 1"/>
+          <p:cNvSpPr>
+            <a:spLocks noGrp="1"/>
+          </p:cNvSpPr>
+          <p:nvPr>
+            <p:ph type="title"/>
+          </p:nvPr>
+        </p:nvSpPr>
+        <p:spPr/>
+        <p:txBody>
+          <a:bodyPr/>
+          <a:lstStyle/>
+          <a:p>
+            <a:r>
+              <a:rPr lang="en-US" dirty="0" smtClean="0"/>
+              <a:t>Fuses</a:t>
+            </a:r>
+            <a:endParaRPr lang="en-US" dirty="0"/>
+          </a:p>
+        </p:txBody>
+      </p:sp>
+      <p:sp>
+        <p:nvSpPr>
+          <p:cNvPr id="3" name="Content Placeholder 2"/>
+          <p:cNvSpPr>
+            <a:spLocks noGrp="1"/>
+          </p:cNvSpPr>
+          <p:nvPr>
+            <p:ph sz="half" idx="1"/>
+          </p:nvPr>
+        </p:nvSpPr>
+        <p:spPr/>
+        <p:txBody>
+          <a:bodyPr>
+            <a:normAutofit/>
+          </a:bodyPr>
+          <a:lstStyle/>
+          <a:p>
+            <a:r>
+              <a:rPr lang="en-US" dirty="0" smtClean="0"/>
+              <a:t>Protection device </a:t>
+            </a:r>
+            <a:r>
+              <a:rPr lang="en-US" dirty="0"/>
+              <a:t>u</a:t>
+            </a:r>
+            <a:r>
+              <a:rPr lang="en-US" dirty="0" smtClean="0"/>
+              <a:t>sed </a:t>
+            </a:r>
+            <a:r>
+              <a:rPr lang="en-US" dirty="0"/>
+              <a:t>to break fault </a:t>
+            </a:r>
+            <a:r>
+              <a:rPr lang="en-US" dirty="0" smtClean="0"/>
+              <a:t>current.</a:t>
+            </a:r>
+          </a:p>
+          <a:p>
+            <a:r>
+              <a:rPr lang="en-US" dirty="0" smtClean="0"/>
+              <a:t>Removes </a:t>
+            </a:r>
+            <a:r>
+              <a:rPr lang="en-US" dirty="0"/>
+              <a:t>faulted </a:t>
+            </a:r>
+            <a:r>
+              <a:rPr lang="en-US" dirty="0" smtClean="0"/>
+              <a:t>sections of a feeder from the system.</a:t>
+            </a:r>
+            <a:endParaRPr lang="en-US" dirty="0"/>
+          </a:p>
+          <a:p>
+            <a:r>
+              <a:rPr lang="en-US" dirty="0"/>
+              <a:t>Need to be manually replaced </a:t>
+            </a:r>
+            <a:r>
+              <a:rPr lang="en-US" dirty="0" smtClean="0"/>
+              <a:t>because </a:t>
+            </a:r>
+            <a:r>
+              <a:rPr lang="en-US" dirty="0"/>
+              <a:t>the fuse sacrifices itself to protect the feeder and its components</a:t>
+            </a:r>
+            <a:r>
+              <a:rPr lang="en-US" dirty="0" smtClean="0"/>
+              <a:t>.</a:t>
+            </a:r>
+          </a:p>
+          <a:p>
+            <a:pPr lvl="1"/>
+            <a:r>
+              <a:rPr lang="en-US" dirty="0"/>
+              <a:t> </a:t>
+            </a:r>
+            <a:r>
+              <a:rPr lang="en-US" dirty="0" smtClean="0"/>
+              <a:t>Fuse designed to ‘blow’ within specified time for given value of fault current. </a:t>
+            </a:r>
+            <a:endParaRPr lang="en-US" dirty="0"/>
+          </a:p>
+        </p:txBody>
+      </p:sp>
+      <p:sp>
+        <p:nvSpPr>
+          <p:cNvPr id="4" name="Slide Number Placeholder 3"/>
+          <p:cNvSpPr>
+            <a:spLocks noGrp="1"/>
+          </p:cNvSpPr>
+          <p:nvPr>
+            <p:ph type="sldNum" sz="quarter" idx="12"/>
+          </p:nvPr>
+        </p:nvSpPr>
+        <p:spPr/>
+        <p:txBody>
+          <a:bodyPr/>
+          <a:lstStyle/>
+          <a:p>
+            <a:fld id="{B6F15528-21DE-4FAA-801E-634DDDAF4B2B}" type="slidenum">
+              <a:rPr lang="en-US" smtClean="0">
+                <a:solidFill>
+                  <a:prstClr val="black">
+                    <a:tint val="75000"/>
+                  </a:prstClr>
+                </a:solidFill>
+              </a:rPr>
+              <a:pPr/>
+              <a:t>9</a:t>
+            </a:fld>
+            <a:endParaRPr lang="en-US" dirty="0">
+              <a:solidFill>
+                <a:prstClr val="black">
+                  <a:tint val="75000"/>
+                </a:prstClr>
+              </a:solidFill>
+            </a:endParaRPr>
+          </a:p>
+        </p:txBody>
+      </p:sp>
+      <p:pic>
+        <p:nvPicPr>
+          <p:cNvPr id="7" name="Content Placeholder 6"/>
+          <p:cNvPicPr>
+            <a:picLocks noGrp="1" noChangeAspect="1"/>
+          </p:cNvPicPr>
+          <p:nvPr>
+            <p:ph sz="half" idx="2"/>
+          </p:nvPr>
+        </p:nvPicPr>
+        <p:blipFill rotWithShape="1">
+          <a:blip r:embed="rId2" cstate="print">
+            <a:extLst>
+              <a:ext uri="{28A0092B-C50C-407E-A947-70E740481C1C}">
+                <a14:useLocalDpi xmlns:a14="http://schemas.microsoft.com/office/drawing/2010/main" val="0"/>
+              </a:ext>
+            </a:extLst>
+          </a:blip>
+          <a:srcRect l="30638" r="10531"/>
+          <a:stretch/>
+        </p:blipFill>
+        <p:spPr>
+          <a:xfrm>
+            <a:off x="4892387" y="1600200"/>
+            <a:ext cx="3550225" cy="4525963"/>
+          </a:xfrm>
+          <a:prstGeom prst="rect">
+            <a:avLst/>
+          </a:prstGeom>
+          <a:ln>
+            <a:noFill/>
+          </a:ln>
+          <a:effectLst>
+            <a:outerShdw blurRad="190500" algn="tl" rotWithShape="0">
+              <a:srgbClr val="000000">
+                <a:alpha val="70000"/>
+              </a:srgbClr>
+            </a:outerShdw>
+          </a:effectLst>
+        </p:spPr>
+      </p:pic>
+    </p:spTree>
+    <p:extLst>
+      <p:ext uri="{BB962C8B-B14F-4D97-AF65-F5344CB8AC3E}">
+        <p14:creationId xmlns:p14="http://schemas.microsoft.com/office/powerpoint/2010/main" val="1305026423"/>
       </p:ext>
     </p:extLst>
   </p:cSld>

</xml_diff>